<commit_message>
Following for Lecture 2:
- Added PDF
- removed proof of "sqrt(3) is irrational"
- corrected error on proof of "number ending in 5, squared, ends in 5"
- removed some things that were already in slide 1
- probably some other changes too.
</commit_message>
<xml_diff>
--- a/University_of_Waterloo/Fall_2021/MATH135/UW_Fall2021_MATH135_Lecture2.pptx
+++ b/University_of_Waterloo/Fall_2021/MATH135/UW_Fall2021_MATH135_Lecture2.pptx
@@ -4,16 +4,15 @@
   <p:sldMasterIdLst>
     <p:sldMasterId id="2147483648" r:id="rId1"/>
   </p:sldMasterIdLst>
+  <p:notesMasterIdLst>
+    <p:notesMasterId r:id="rId7"/>
+  </p:notesMasterIdLst>
   <p:sldIdLst>
     <p:sldId id="257" r:id="rId2"/>
     <p:sldId id="256" r:id="rId3"/>
-    <p:sldId id="263" r:id="rId4"/>
-    <p:sldId id="262" r:id="rId5"/>
-    <p:sldId id="264" r:id="rId6"/>
-    <p:sldId id="265" r:id="rId7"/>
-    <p:sldId id="266" r:id="rId8"/>
-    <p:sldId id="267" r:id="rId9"/>
-    <p:sldId id="268" r:id="rId10"/>
+    <p:sldId id="262" r:id="rId4"/>
+    <p:sldId id="264" r:id="rId5"/>
+    <p:sldId id="265" r:id="rId6"/>
   </p:sldIdLst>
   <p:sldSz cx="12192000" cy="6858000"/>
   <p:notesSz cx="6858000" cy="9144000"/>
@@ -120,6 +119,355 @@
 </p:presentation>
 </file>
 
+<file path=ppt/notesMasters/notesMaster1.xml><?xml version="1.0" encoding="utf-8"?>
+<p:notesMaster xmlns:a="http://schemas.openxmlformats.org/drawingml/2006/main" xmlns:r="http://schemas.openxmlformats.org/officeDocument/2006/relationships" xmlns:p="http://schemas.openxmlformats.org/presentationml/2006/main">
+  <p:cSld>
+    <p:bg>
+      <p:bgRef idx="1001">
+        <a:schemeClr val="bg1"/>
+      </p:bgRef>
+    </p:bg>
+    <p:spTree>
+      <p:nvGrpSpPr>
+        <p:cNvPr id="1" name=""/>
+        <p:cNvGrpSpPr/>
+        <p:nvPr/>
+      </p:nvGrpSpPr>
+      <p:grpSpPr>
+        <a:xfrm>
+          <a:off x="0" y="0"/>
+          <a:ext cx="0" cy="0"/>
+          <a:chOff x="0" y="0"/>
+          <a:chExt cx="0" cy="0"/>
+        </a:xfrm>
+      </p:grpSpPr>
+      <p:sp>
+        <p:nvSpPr>
+          <p:cNvPr id="2" name="Header Placeholder 1"/>
+          <p:cNvSpPr>
+            <a:spLocks noGrp="1"/>
+          </p:cNvSpPr>
+          <p:nvPr>
+            <p:ph type="hdr" sz="quarter"/>
+          </p:nvPr>
+        </p:nvSpPr>
+        <p:spPr>
+          <a:xfrm>
+            <a:off x="0" y="0"/>
+            <a:ext cx="2971800" cy="458788"/>
+          </a:xfrm>
+          <a:prstGeom prst="rect">
+            <a:avLst/>
+          </a:prstGeom>
+        </p:spPr>
+        <p:txBody>
+          <a:bodyPr vert="horz" lIns="91440" tIns="45720" rIns="91440" bIns="45720" rtlCol="0"/>
+          <a:lstStyle>
+            <a:lvl1pPr algn="l">
+              <a:defRPr sz="1200"/>
+            </a:lvl1pPr>
+          </a:lstStyle>
+          <a:p>
+            <a:endParaRPr lang="en-US"/>
+          </a:p>
+        </p:txBody>
+      </p:sp>
+      <p:sp>
+        <p:nvSpPr>
+          <p:cNvPr id="3" name="Date Placeholder 2"/>
+          <p:cNvSpPr>
+            <a:spLocks noGrp="1"/>
+          </p:cNvSpPr>
+          <p:nvPr>
+            <p:ph type="dt" idx="1"/>
+          </p:nvPr>
+        </p:nvSpPr>
+        <p:spPr>
+          <a:xfrm>
+            <a:off x="3884613" y="0"/>
+            <a:ext cx="2971800" cy="458788"/>
+          </a:xfrm>
+          <a:prstGeom prst="rect">
+            <a:avLst/>
+          </a:prstGeom>
+        </p:spPr>
+        <p:txBody>
+          <a:bodyPr vert="horz" lIns="91440" tIns="45720" rIns="91440" bIns="45720" rtlCol="0"/>
+          <a:lstStyle>
+            <a:lvl1pPr algn="r">
+              <a:defRPr sz="1200"/>
+            </a:lvl1pPr>
+          </a:lstStyle>
+          <a:p>
+            <a:fld id="{F8CDB933-74D0-44EB-BC16-6CC073DD5780}" type="datetimeFigureOut">
+              <a:rPr lang="en-US" smtClean="0"/>
+              <a:t>9/15/2021</a:t>
+            </a:fld>
+            <a:endParaRPr lang="en-US"/>
+          </a:p>
+        </p:txBody>
+      </p:sp>
+      <p:sp>
+        <p:nvSpPr>
+          <p:cNvPr id="4" name="Slide Image Placeholder 3"/>
+          <p:cNvSpPr>
+            <a:spLocks noGrp="1" noRot="1" noChangeAspect="1"/>
+          </p:cNvSpPr>
+          <p:nvPr>
+            <p:ph type="sldImg" idx="2"/>
+          </p:nvPr>
+        </p:nvSpPr>
+        <p:spPr>
+          <a:xfrm>
+            <a:off x="685800" y="1143000"/>
+            <a:ext cx="5486400" cy="3086100"/>
+          </a:xfrm>
+          <a:prstGeom prst="rect">
+            <a:avLst/>
+          </a:prstGeom>
+          <a:noFill/>
+          <a:ln w="12700">
+            <a:solidFill>
+              <a:prstClr val="black"/>
+            </a:solidFill>
+          </a:ln>
+        </p:spPr>
+        <p:txBody>
+          <a:bodyPr vert="horz" lIns="91440" tIns="45720" rIns="91440" bIns="45720" rtlCol="0" anchor="ctr"/>
+          <a:lstStyle/>
+          <a:p>
+            <a:endParaRPr lang="en-US"/>
+          </a:p>
+        </p:txBody>
+      </p:sp>
+      <p:sp>
+        <p:nvSpPr>
+          <p:cNvPr id="5" name="Notes Placeholder 4"/>
+          <p:cNvSpPr>
+            <a:spLocks noGrp="1"/>
+          </p:cNvSpPr>
+          <p:nvPr>
+            <p:ph type="body" sz="quarter" idx="3"/>
+          </p:nvPr>
+        </p:nvSpPr>
+        <p:spPr>
+          <a:xfrm>
+            <a:off x="685800" y="4400550"/>
+            <a:ext cx="5486400" cy="3600450"/>
+          </a:xfrm>
+          <a:prstGeom prst="rect">
+            <a:avLst/>
+          </a:prstGeom>
+        </p:spPr>
+        <p:txBody>
+          <a:bodyPr vert="horz" lIns="91440" tIns="45720" rIns="91440" bIns="45720" rtlCol="0"/>
+          <a:lstStyle/>
+          <a:p>
+            <a:pPr lvl="0"/>
+            <a:r>
+              <a:rPr lang="en-US"/>
+              <a:t>Edit Master text styles</a:t>
+            </a:r>
+          </a:p>
+          <a:p>
+            <a:pPr lvl="1"/>
+            <a:r>
+              <a:rPr lang="en-US"/>
+              <a:t>Second level</a:t>
+            </a:r>
+          </a:p>
+          <a:p>
+            <a:pPr lvl="2"/>
+            <a:r>
+              <a:rPr lang="en-US"/>
+              <a:t>Third level</a:t>
+            </a:r>
+          </a:p>
+          <a:p>
+            <a:pPr lvl="3"/>
+            <a:r>
+              <a:rPr lang="en-US"/>
+              <a:t>Fourth level</a:t>
+            </a:r>
+          </a:p>
+          <a:p>
+            <a:pPr lvl="4"/>
+            <a:r>
+              <a:rPr lang="en-US"/>
+              <a:t>Fifth level</a:t>
+            </a:r>
+          </a:p>
+        </p:txBody>
+      </p:sp>
+      <p:sp>
+        <p:nvSpPr>
+          <p:cNvPr id="6" name="Footer Placeholder 5"/>
+          <p:cNvSpPr>
+            <a:spLocks noGrp="1"/>
+          </p:cNvSpPr>
+          <p:nvPr>
+            <p:ph type="ftr" sz="quarter" idx="4"/>
+          </p:nvPr>
+        </p:nvSpPr>
+        <p:spPr>
+          <a:xfrm>
+            <a:off x="0" y="8685213"/>
+            <a:ext cx="2971800" cy="458787"/>
+          </a:xfrm>
+          <a:prstGeom prst="rect">
+            <a:avLst/>
+          </a:prstGeom>
+        </p:spPr>
+        <p:txBody>
+          <a:bodyPr vert="horz" lIns="91440" tIns="45720" rIns="91440" bIns="45720" rtlCol="0" anchor="b"/>
+          <a:lstStyle>
+            <a:lvl1pPr algn="l">
+              <a:defRPr sz="1200"/>
+            </a:lvl1pPr>
+          </a:lstStyle>
+          <a:p>
+            <a:endParaRPr lang="en-US"/>
+          </a:p>
+        </p:txBody>
+      </p:sp>
+      <p:sp>
+        <p:nvSpPr>
+          <p:cNvPr id="7" name="Slide Number Placeholder 6"/>
+          <p:cNvSpPr>
+            <a:spLocks noGrp="1"/>
+          </p:cNvSpPr>
+          <p:nvPr>
+            <p:ph type="sldNum" sz="quarter" idx="5"/>
+          </p:nvPr>
+        </p:nvSpPr>
+        <p:spPr>
+          <a:xfrm>
+            <a:off x="3884613" y="8685213"/>
+            <a:ext cx="2971800" cy="458787"/>
+          </a:xfrm>
+          <a:prstGeom prst="rect">
+            <a:avLst/>
+          </a:prstGeom>
+        </p:spPr>
+        <p:txBody>
+          <a:bodyPr vert="horz" lIns="91440" tIns="45720" rIns="91440" bIns="45720" rtlCol="0" anchor="b"/>
+          <a:lstStyle>
+            <a:lvl1pPr algn="r">
+              <a:defRPr sz="1200"/>
+            </a:lvl1pPr>
+          </a:lstStyle>
+          <a:p>
+            <a:fld id="{7D5830E5-1ED7-466A-B8C7-139928AEB953}" type="slidenum">
+              <a:rPr lang="en-US" smtClean="0"/>
+              <a:t>‹#›</a:t>
+            </a:fld>
+            <a:endParaRPr lang="en-US"/>
+          </a:p>
+        </p:txBody>
+      </p:sp>
+    </p:spTree>
+    <p:extLst>
+      <p:ext uri="{BB962C8B-B14F-4D97-AF65-F5344CB8AC3E}">
+        <p14:creationId xmlns:p14="http://schemas.microsoft.com/office/powerpoint/2010/main" val="3382298336"/>
+      </p:ext>
+    </p:extLst>
+  </p:cSld>
+  <p:clrMap bg1="lt1" tx1="dk1" bg2="lt2" tx2="dk2" accent1="accent1" accent2="accent2" accent3="accent3" accent4="accent4" accent5="accent5" accent6="accent6" hlink="hlink" folHlink="folHlink"/>
+  <p:notesStyle>
+    <a:lvl1pPr marL="0" algn="l" defTabSz="914400" rtl="0" eaLnBrk="1" latinLnBrk="0" hangingPunct="1">
+      <a:defRPr sz="1200" kern="1200">
+        <a:solidFill>
+          <a:schemeClr val="tx1"/>
+        </a:solidFill>
+        <a:latin typeface="+mn-lt"/>
+        <a:ea typeface="+mn-ea"/>
+        <a:cs typeface="+mn-cs"/>
+      </a:defRPr>
+    </a:lvl1pPr>
+    <a:lvl2pPr marL="457200" algn="l" defTabSz="914400" rtl="0" eaLnBrk="1" latinLnBrk="0" hangingPunct="1">
+      <a:defRPr sz="1200" kern="1200">
+        <a:solidFill>
+          <a:schemeClr val="tx1"/>
+        </a:solidFill>
+        <a:latin typeface="+mn-lt"/>
+        <a:ea typeface="+mn-ea"/>
+        <a:cs typeface="+mn-cs"/>
+      </a:defRPr>
+    </a:lvl2pPr>
+    <a:lvl3pPr marL="914400" algn="l" defTabSz="914400" rtl="0" eaLnBrk="1" latinLnBrk="0" hangingPunct="1">
+      <a:defRPr sz="1200" kern="1200">
+        <a:solidFill>
+          <a:schemeClr val="tx1"/>
+        </a:solidFill>
+        <a:latin typeface="+mn-lt"/>
+        <a:ea typeface="+mn-ea"/>
+        <a:cs typeface="+mn-cs"/>
+      </a:defRPr>
+    </a:lvl3pPr>
+    <a:lvl4pPr marL="1371600" algn="l" defTabSz="914400" rtl="0" eaLnBrk="1" latinLnBrk="0" hangingPunct="1">
+      <a:defRPr sz="1200" kern="1200">
+        <a:solidFill>
+          <a:schemeClr val="tx1"/>
+        </a:solidFill>
+        <a:latin typeface="+mn-lt"/>
+        <a:ea typeface="+mn-ea"/>
+        <a:cs typeface="+mn-cs"/>
+      </a:defRPr>
+    </a:lvl4pPr>
+    <a:lvl5pPr marL="1828800" algn="l" defTabSz="914400" rtl="0" eaLnBrk="1" latinLnBrk="0" hangingPunct="1">
+      <a:defRPr sz="1200" kern="1200">
+        <a:solidFill>
+          <a:schemeClr val="tx1"/>
+        </a:solidFill>
+        <a:latin typeface="+mn-lt"/>
+        <a:ea typeface="+mn-ea"/>
+        <a:cs typeface="+mn-cs"/>
+      </a:defRPr>
+    </a:lvl5pPr>
+    <a:lvl6pPr marL="2286000" algn="l" defTabSz="914400" rtl="0" eaLnBrk="1" latinLnBrk="0" hangingPunct="1">
+      <a:defRPr sz="1200" kern="1200">
+        <a:solidFill>
+          <a:schemeClr val="tx1"/>
+        </a:solidFill>
+        <a:latin typeface="+mn-lt"/>
+        <a:ea typeface="+mn-ea"/>
+        <a:cs typeface="+mn-cs"/>
+      </a:defRPr>
+    </a:lvl6pPr>
+    <a:lvl7pPr marL="2743200" algn="l" defTabSz="914400" rtl="0" eaLnBrk="1" latinLnBrk="0" hangingPunct="1">
+      <a:defRPr sz="1200" kern="1200">
+        <a:solidFill>
+          <a:schemeClr val="tx1"/>
+        </a:solidFill>
+        <a:latin typeface="+mn-lt"/>
+        <a:ea typeface="+mn-ea"/>
+        <a:cs typeface="+mn-cs"/>
+      </a:defRPr>
+    </a:lvl7pPr>
+    <a:lvl8pPr marL="3200400" algn="l" defTabSz="914400" rtl="0" eaLnBrk="1" latinLnBrk="0" hangingPunct="1">
+      <a:defRPr sz="1200" kern="1200">
+        <a:solidFill>
+          <a:schemeClr val="tx1"/>
+        </a:solidFill>
+        <a:latin typeface="+mn-lt"/>
+        <a:ea typeface="+mn-ea"/>
+        <a:cs typeface="+mn-cs"/>
+      </a:defRPr>
+    </a:lvl8pPr>
+    <a:lvl9pPr marL="3657600" algn="l" defTabSz="914400" rtl="0" eaLnBrk="1" latinLnBrk="0" hangingPunct="1">
+      <a:defRPr sz="1200" kern="1200">
+        <a:solidFill>
+          <a:schemeClr val="tx1"/>
+        </a:solidFill>
+        <a:latin typeface="+mn-lt"/>
+        <a:ea typeface="+mn-ea"/>
+        <a:cs typeface="+mn-cs"/>
+      </a:defRPr>
+    </a:lvl9pPr>
+  </p:notesStyle>
+</p:notesMaster>
+</file>
+
 <file path=ppt/slideLayouts/slideLayout1.xml><?xml version="1.0" encoding="utf-8"?>
 <p:sldLayout xmlns:a="http://schemas.openxmlformats.org/drawingml/2006/main" xmlns:r="http://schemas.openxmlformats.org/officeDocument/2006/relationships" xmlns:p="http://schemas.openxmlformats.org/presentationml/2006/main" type="title" preserve="1">
   <p:cSld name="Title Slide">
@@ -265,9 +613,9 @@
           <a:bodyPr/>
           <a:lstStyle/>
           <a:p>
-            <a:fld id="{6290209C-503C-4F42-9D62-38FCC3384F43}" type="datetimeFigureOut">
+            <a:fld id="{205404C4-9090-416A-986B-5BA02B25D7ED}" type="datetime1">
               <a:rPr lang="en-US" smtClean="0"/>
-              <a:t>9/10/2021</a:t>
+              <a:t>9/15/2021</a:t>
             </a:fld>
             <a:endParaRPr lang="en-US"/>
           </a:p>
@@ -289,41 +637,21 @@
             <p:ph type="ftr" sz="quarter" idx="11"/>
           </p:nvPr>
         </p:nvSpPr>
-        <p:spPr/>
+        <p:spPr>
+          <a:xfrm>
+            <a:off x="8811768" y="6503606"/>
+            <a:ext cx="4114800" cy="365125"/>
+          </a:xfrm>
+        </p:spPr>
         <p:txBody>
           <a:bodyPr/>
           <a:lstStyle/>
           <a:p>
-            <a:endParaRPr lang="en-US"/>
-          </a:p>
-        </p:txBody>
-      </p:sp>
-      <p:sp>
-        <p:nvSpPr>
-          <p:cNvPr id="6" name="Slide Number Placeholder 5">
-            <a:extLst>
-              <a:ext uri="{FF2B5EF4-FFF2-40B4-BE49-F238E27FC236}">
-                <a16:creationId xmlns:a16="http://schemas.microsoft.com/office/drawing/2014/main" id="{0C4019FA-7821-4938-BCFD-E19FA93F995C}"/>
-              </a:ext>
-            </a:extLst>
-          </p:cNvPr>
-          <p:cNvSpPr>
-            <a:spLocks noGrp="1"/>
-          </p:cNvSpPr>
-          <p:nvPr>
-            <p:ph type="sldNum" sz="quarter" idx="12"/>
-          </p:nvPr>
-        </p:nvSpPr>
-        <p:spPr/>
-        <p:txBody>
-          <a:bodyPr/>
-          <a:lstStyle/>
-          <a:p>
-            <a:fld id="{F76B1B54-9536-4654-B658-6C9F83E3D8D2}" type="slidenum">
-              <a:rPr lang="en-US" smtClean="0"/>
-              <a:t>‹#›</a:t>
-            </a:fld>
-            <a:endParaRPr lang="en-US"/>
+            <a:r>
+              <a:rPr lang="sv-SE" dirty="0"/>
+              <a:t>Dr. Nike Dattani, MATH 135, Fall 2021</a:t>
+            </a:r>
+            <a:endParaRPr lang="en-US" dirty="0"/>
           </a:p>
         </p:txBody>
       </p:sp>
@@ -463,9 +791,9 @@
           <a:bodyPr/>
           <a:lstStyle/>
           <a:p>
-            <a:fld id="{6290209C-503C-4F42-9D62-38FCC3384F43}" type="datetimeFigureOut">
+            <a:fld id="{FAEBB285-DAB4-4D9F-874C-99996235C253}" type="datetime1">
               <a:rPr lang="en-US" smtClean="0"/>
-              <a:t>9/10/2021</a:t>
+              <a:t>9/15/2021</a:t>
             </a:fld>
             <a:endParaRPr lang="en-US"/>
           </a:p>
@@ -492,6 +820,10 @@
           <a:bodyPr/>
           <a:lstStyle/>
           <a:p>
+            <a:r>
+              <a:rPr lang="sv-SE"/>
+              <a:t>Dr. Nike Dattani, MATH 135, Fall 2021</a:t>
+            </a:r>
             <a:endParaRPr lang="en-US"/>
           </a:p>
         </p:txBody>
@@ -671,9 +1003,9 @@
           <a:bodyPr/>
           <a:lstStyle/>
           <a:p>
-            <a:fld id="{6290209C-503C-4F42-9D62-38FCC3384F43}" type="datetimeFigureOut">
+            <a:fld id="{0FF31FE9-7F49-4B97-AC36-43280002E18D}" type="datetime1">
               <a:rPr lang="en-US" smtClean="0"/>
-              <a:t>9/10/2021</a:t>
+              <a:t>9/15/2021</a:t>
             </a:fld>
             <a:endParaRPr lang="en-US"/>
           </a:p>
@@ -700,6 +1032,10 @@
           <a:bodyPr/>
           <a:lstStyle/>
           <a:p>
+            <a:r>
+              <a:rPr lang="sv-SE"/>
+              <a:t>Dr. Nike Dattani, MATH 135, Fall 2021</a:t>
+            </a:r>
             <a:endParaRPr lang="en-US"/>
           </a:p>
         </p:txBody>
@@ -869,9 +1205,9 @@
           <a:bodyPr/>
           <a:lstStyle/>
           <a:p>
-            <a:fld id="{6290209C-503C-4F42-9D62-38FCC3384F43}" type="datetimeFigureOut">
+            <a:fld id="{B29E1E8D-F33A-4735-9250-C12D0FADE3AE}" type="datetime1">
               <a:rPr lang="en-US" smtClean="0"/>
-              <a:t>9/10/2021</a:t>
+              <a:t>9/15/2021</a:t>
             </a:fld>
             <a:endParaRPr lang="en-US"/>
           </a:p>
@@ -898,6 +1234,10 @@
           <a:bodyPr/>
           <a:lstStyle/>
           <a:p>
+            <a:r>
+              <a:rPr lang="sv-SE"/>
+              <a:t>Dr. Nike Dattani, MATH 135, Fall 2021</a:t>
+            </a:r>
             <a:endParaRPr lang="en-US"/>
           </a:p>
         </p:txBody>
@@ -1144,9 +1484,9 @@
           <a:bodyPr/>
           <a:lstStyle/>
           <a:p>
-            <a:fld id="{6290209C-503C-4F42-9D62-38FCC3384F43}" type="datetimeFigureOut">
+            <a:fld id="{F1C185E0-F4F9-4EEA-B557-BBDCF0614CB5}" type="datetime1">
               <a:rPr lang="en-US" smtClean="0"/>
-              <a:t>9/10/2021</a:t>
+              <a:t>9/15/2021</a:t>
             </a:fld>
             <a:endParaRPr lang="en-US"/>
           </a:p>
@@ -1173,6 +1513,10 @@
           <a:bodyPr/>
           <a:lstStyle/>
           <a:p>
+            <a:r>
+              <a:rPr lang="sv-SE"/>
+              <a:t>Dr. Nike Dattani, MATH 135, Fall 2021</a:t>
+            </a:r>
             <a:endParaRPr lang="en-US"/>
           </a:p>
         </p:txBody>
@@ -1409,9 +1753,9 @@
           <a:bodyPr/>
           <a:lstStyle/>
           <a:p>
-            <a:fld id="{6290209C-503C-4F42-9D62-38FCC3384F43}" type="datetimeFigureOut">
+            <a:fld id="{9AC9E134-E19A-4FAB-94FC-68AB67311E74}" type="datetime1">
               <a:rPr lang="en-US" smtClean="0"/>
-              <a:t>9/10/2021</a:t>
+              <a:t>9/15/2021</a:t>
             </a:fld>
             <a:endParaRPr lang="en-US"/>
           </a:p>
@@ -1438,6 +1782,10 @@
           <a:bodyPr/>
           <a:lstStyle/>
           <a:p>
+            <a:r>
+              <a:rPr lang="sv-SE"/>
+              <a:t>Dr. Nike Dattani, MATH 135, Fall 2021</a:t>
+            </a:r>
             <a:endParaRPr lang="en-US"/>
           </a:p>
         </p:txBody>
@@ -1821,9 +2169,9 @@
           <a:bodyPr/>
           <a:lstStyle/>
           <a:p>
-            <a:fld id="{6290209C-503C-4F42-9D62-38FCC3384F43}" type="datetimeFigureOut">
+            <a:fld id="{44690402-8D91-483F-A9D1-7AA83CA1BA4A}" type="datetime1">
               <a:rPr lang="en-US" smtClean="0"/>
-              <a:t>9/10/2021</a:t>
+              <a:t>9/15/2021</a:t>
             </a:fld>
             <a:endParaRPr lang="en-US"/>
           </a:p>
@@ -1850,6 +2198,10 @@
           <a:bodyPr/>
           <a:lstStyle/>
           <a:p>
+            <a:r>
+              <a:rPr lang="sv-SE"/>
+              <a:t>Dr. Nike Dattani, MATH 135, Fall 2021</a:t>
+            </a:r>
             <a:endParaRPr lang="en-US"/>
           </a:p>
         </p:txBody>
@@ -1962,9 +2314,9 @@
           <a:bodyPr/>
           <a:lstStyle/>
           <a:p>
-            <a:fld id="{6290209C-503C-4F42-9D62-38FCC3384F43}" type="datetimeFigureOut">
+            <a:fld id="{BE48D627-8239-4A18-A49E-A0592FBEF32B}" type="datetime1">
               <a:rPr lang="en-US" smtClean="0"/>
-              <a:t>9/10/2021</a:t>
+              <a:t>9/15/2021</a:t>
             </a:fld>
             <a:endParaRPr lang="en-US"/>
           </a:p>
@@ -1991,6 +2343,10 @@
           <a:bodyPr/>
           <a:lstStyle/>
           <a:p>
+            <a:r>
+              <a:rPr lang="sv-SE"/>
+              <a:t>Dr. Nike Dattani, MATH 135, Fall 2021</a:t>
+            </a:r>
             <a:endParaRPr lang="en-US"/>
           </a:p>
         </p:txBody>
@@ -2075,9 +2431,9 @@
           <a:bodyPr/>
           <a:lstStyle/>
           <a:p>
-            <a:fld id="{6290209C-503C-4F42-9D62-38FCC3384F43}" type="datetimeFigureOut">
+            <a:fld id="{83AB0741-9C1B-4E08-9A5F-407F96009A00}" type="datetime1">
               <a:rPr lang="en-US" smtClean="0"/>
-              <a:t>9/10/2021</a:t>
+              <a:t>9/15/2021</a:t>
             </a:fld>
             <a:endParaRPr lang="en-US"/>
           </a:p>
@@ -2104,6 +2460,10 @@
           <a:bodyPr/>
           <a:lstStyle/>
           <a:p>
+            <a:r>
+              <a:rPr lang="sv-SE"/>
+              <a:t>Dr. Nike Dattani, MATH 135, Fall 2021</a:t>
+            </a:r>
             <a:endParaRPr lang="en-US"/>
           </a:p>
         </p:txBody>
@@ -2386,9 +2746,9 @@
           <a:bodyPr/>
           <a:lstStyle/>
           <a:p>
-            <a:fld id="{6290209C-503C-4F42-9D62-38FCC3384F43}" type="datetimeFigureOut">
+            <a:fld id="{45EE6393-2680-4919-AA6F-21E62D296AED}" type="datetime1">
               <a:rPr lang="en-US" smtClean="0"/>
-              <a:t>9/10/2021</a:t>
+              <a:t>9/15/2021</a:t>
             </a:fld>
             <a:endParaRPr lang="en-US"/>
           </a:p>
@@ -2415,6 +2775,10 @@
           <a:bodyPr/>
           <a:lstStyle/>
           <a:p>
+            <a:r>
+              <a:rPr lang="sv-SE"/>
+              <a:t>Dr. Nike Dattani, MATH 135, Fall 2021</a:t>
+            </a:r>
             <a:endParaRPr lang="en-US"/>
           </a:p>
         </p:txBody>
@@ -2674,9 +3038,9 @@
           <a:bodyPr/>
           <a:lstStyle/>
           <a:p>
-            <a:fld id="{6290209C-503C-4F42-9D62-38FCC3384F43}" type="datetimeFigureOut">
+            <a:fld id="{6EBA3616-70F6-4B2F-B8E0-E7163390E43E}" type="datetime1">
               <a:rPr lang="en-US" smtClean="0"/>
-              <a:t>9/10/2021</a:t>
+              <a:t>9/15/2021</a:t>
             </a:fld>
             <a:endParaRPr lang="en-US"/>
           </a:p>
@@ -2703,6 +3067,10 @@
           <a:bodyPr/>
           <a:lstStyle/>
           <a:p>
+            <a:r>
+              <a:rPr lang="sv-SE"/>
+              <a:t>Dr. Nike Dattani, MATH 135, Fall 2021</a:t>
+            </a:r>
             <a:endParaRPr lang="en-US"/>
           </a:p>
         </p:txBody>
@@ -2915,9 +3283,9 @@
             </a:lvl1pPr>
           </a:lstStyle>
           <a:p>
-            <a:fld id="{6290209C-503C-4F42-9D62-38FCC3384F43}" type="datetimeFigureOut">
+            <a:fld id="{25C8B9B5-0CCE-454D-A45A-A61FBBB76E95}" type="datetime1">
               <a:rPr lang="en-US" smtClean="0"/>
-              <a:t>9/10/2021</a:t>
+              <a:t>9/15/2021</a:t>
             </a:fld>
             <a:endParaRPr lang="en-US"/>
           </a:p>
@@ -2962,6 +3330,10 @@
             </a:lvl1pPr>
           </a:lstStyle>
           <a:p>
+            <a:r>
+              <a:rPr lang="sv-SE"/>
+              <a:t>Dr. Nike Dattani, MATH 135, Fall 2021</a:t>
+            </a:r>
             <a:endParaRPr lang="en-US"/>
           </a:p>
         </p:txBody>
@@ -3034,6 +3406,7 @@
     <p:sldLayoutId id="2147483658" r:id="rId10"/>
     <p:sldLayoutId id="2147483659" r:id="rId11"/>
   </p:sldLayoutIdLst>
+  <p:hf sldNum="0" hdr="0" dt="0"/>
   <p:txStyles>
     <p:titleStyle>
       <a:lvl1pPr algn="l" defTabSz="914400" rtl="0" eaLnBrk="1" latinLnBrk="0" hangingPunct="1">
@@ -3631,6 +4004,35 @@
           </a:p>
         </p:txBody>
       </p:sp>
+      <p:sp>
+        <p:nvSpPr>
+          <p:cNvPr id="5" name="Footer Placeholder 4">
+            <a:extLst>
+              <a:ext uri="{FF2B5EF4-FFF2-40B4-BE49-F238E27FC236}">
+                <a16:creationId xmlns:a16="http://schemas.microsoft.com/office/drawing/2014/main" id="{FF148C83-FE79-4569-A9F6-A88F7919C1A2}"/>
+              </a:ext>
+            </a:extLst>
+          </p:cNvPr>
+          <p:cNvSpPr>
+            <a:spLocks noGrp="1"/>
+          </p:cNvSpPr>
+          <p:nvPr>
+            <p:ph type="ftr" sz="quarter" idx="11"/>
+          </p:nvPr>
+        </p:nvSpPr>
+        <p:spPr/>
+        <p:txBody>
+          <a:bodyPr/>
+          <a:lstStyle/>
+          <a:p>
+            <a:r>
+              <a:rPr lang="sv-SE"/>
+              <a:t>Dr. Nike Dattani, MATH 135, Fall 2021</a:t>
+            </a:r>
+            <a:endParaRPr lang="en-US"/>
+          </a:p>
+        </p:txBody>
+      </p:sp>
     </p:spTree>
     <p:extLst>
       <p:ext uri="{BB962C8B-B14F-4D97-AF65-F5344CB8AC3E}">
@@ -3833,13 +4235,13 @@
         </p:spPr>
         <p:txBody>
           <a:bodyPr>
-            <a:normAutofit fontScale="92500"/>
+            <a:normAutofit/>
           </a:bodyPr>
           <a:lstStyle/>
           <a:p>
             <a:r>
               <a:rPr lang="en-US" sz="4400" dirty="0"/>
-              <a:t>Quick introduction to some mathematical language!</a:t>
+              <a:t>Assignment 1!</a:t>
             </a:r>
           </a:p>
         </p:txBody>
@@ -3858,8 +4260,8 @@
         </p:nvSpPr>
         <p:spPr>
           <a:xfrm>
-            <a:off x="79695" y="902362"/>
-            <a:ext cx="11944524" cy="4985980"/>
+            <a:off x="159391" y="792748"/>
+            <a:ext cx="11697050" cy="7325082"/>
           </a:xfrm>
           <a:prstGeom prst="rect">
             <a:avLst/>
@@ -3878,574 +4280,6 @@
             </a:pPr>
             <a:r>
               <a:rPr lang="en-US" dirty="0"/>
-              <a:t>For all</a:t>
-            </a:r>
-          </a:p>
-          <a:p>
-            <a:pPr marL="285750" indent="-285750">
-              <a:buFont typeface="Arial" panose="020B0604020202020204" pitchFamily="34" charset="0"/>
-              <a:buChar char="•"/>
-            </a:pPr>
-            <a:r>
-              <a:rPr lang="en-US" dirty="0"/>
-              <a:t>There exists / There does not exist</a:t>
-            </a:r>
-          </a:p>
-          <a:p>
-            <a:pPr marL="285750" indent="-285750">
-              <a:buFont typeface="Arial" panose="020B0604020202020204" pitchFamily="34" charset="0"/>
-              <a:buChar char="•"/>
-            </a:pPr>
-            <a:r>
-              <a:rPr lang="en-US" dirty="0"/>
-              <a:t>Such that</a:t>
-            </a:r>
-          </a:p>
-          <a:p>
-            <a:pPr marL="285750" indent="-285750">
-              <a:buFont typeface="Arial" panose="020B0604020202020204" pitchFamily="34" charset="0"/>
-              <a:buChar char="•"/>
-            </a:pPr>
-            <a:r>
-              <a:rPr lang="en-US" dirty="0"/>
-              <a:t>“Is an element of…” / “Is not an element of…”</a:t>
-            </a:r>
-          </a:p>
-          <a:p>
-            <a:pPr marL="285750" indent="-285750">
-              <a:buFont typeface="Arial" panose="020B0604020202020204" pitchFamily="34" charset="0"/>
-              <a:buChar char="•"/>
-            </a:pPr>
-            <a:endParaRPr lang="en-US" sz="800" dirty="0"/>
-          </a:p>
-          <a:p>
-            <a:pPr marL="285750" indent="-285750">
-              <a:buFont typeface="Arial" panose="020B0604020202020204" pitchFamily="34" charset="0"/>
-              <a:buChar char="•"/>
-            </a:pPr>
-            <a:r>
-              <a:rPr lang="en-US" dirty="0"/>
-              <a:t>Sets and elements: {♣,♦,♥,♠}, {1,2,3}, {1,2,{1,2,3}} , ∅ = { } </a:t>
-            </a:r>
-          </a:p>
-          <a:p>
-            <a:pPr marL="285750" indent="-285750">
-              <a:buFont typeface="Arial" panose="020B0604020202020204" pitchFamily="34" charset="0"/>
-              <a:buChar char="•"/>
-            </a:pPr>
-            <a:r>
-              <a:rPr lang="en-US" dirty="0"/>
-              <a:t>Natural numbers (in this course, {1,2,3,…}), Integers, Rational numbers, Real numbers, Complex numbers </a:t>
-            </a:r>
-          </a:p>
-          <a:p>
-            <a:pPr marL="285750" indent="-285750">
-              <a:buFont typeface="Arial" panose="020B0604020202020204" pitchFamily="34" charset="0"/>
-              <a:buChar char="•"/>
-            </a:pPr>
-            <a:endParaRPr lang="en-US" sz="1000" dirty="0"/>
-          </a:p>
-          <a:p>
-            <a:pPr marL="285750" indent="-285750">
-              <a:buFont typeface="Arial" panose="020B0604020202020204" pitchFamily="34" charset="0"/>
-              <a:buChar char="•"/>
-            </a:pPr>
-            <a:r>
-              <a:rPr lang="en-US" dirty="0"/>
-              <a:t>Negation: ¬A, ¬(¬A) = A</a:t>
-            </a:r>
-          </a:p>
-          <a:p>
-            <a:pPr marL="285750" indent="-285750">
-              <a:buFont typeface="Arial" panose="020B0604020202020204" pitchFamily="34" charset="0"/>
-              <a:buChar char="•"/>
-            </a:pPr>
-            <a:endParaRPr lang="en-US" sz="1050" dirty="0"/>
-          </a:p>
-          <a:p>
-            <a:pPr marL="285750" indent="-285750">
-              <a:buFont typeface="Arial" panose="020B0604020202020204" pitchFamily="34" charset="0"/>
-              <a:buChar char="•"/>
-            </a:pPr>
-            <a:r>
-              <a:rPr lang="en-US" sz="1700" dirty="0">
-                <a:solidFill>
-                  <a:srgbClr val="FF0000"/>
-                </a:solidFill>
-              </a:rPr>
-              <a:t>Open sentence: sentence containing one or more variables, where truth of the sentence awaits specification of the variable(s)</a:t>
-            </a:r>
-          </a:p>
-          <a:p>
-            <a:pPr marL="742950" lvl="1" indent="-285750">
-              <a:buFont typeface="Arial" panose="020B0604020202020204" pitchFamily="34" charset="0"/>
-              <a:buChar char="•"/>
-            </a:pPr>
-            <a:r>
-              <a:rPr lang="en-US" dirty="0">
-                <a:solidFill>
-                  <a:srgbClr val="FF0000"/>
-                </a:solidFill>
-              </a:rPr>
-              <a:t>P(x) is a sentence depending on x.  Q(</a:t>
-            </a:r>
-            <a:r>
-              <a:rPr lang="en-US" dirty="0" err="1">
-                <a:solidFill>
-                  <a:srgbClr val="FF0000"/>
-                </a:solidFill>
-              </a:rPr>
-              <a:t>x,y</a:t>
-            </a:r>
-            <a:r>
-              <a:rPr lang="en-US" dirty="0">
-                <a:solidFill>
-                  <a:srgbClr val="FF0000"/>
-                </a:solidFill>
-              </a:rPr>
-              <a:t>) is a sentence depending on x and y.</a:t>
-            </a:r>
-          </a:p>
-          <a:p>
-            <a:pPr lvl="1"/>
-            <a:endParaRPr lang="en-US" sz="1100" dirty="0"/>
-          </a:p>
-          <a:p>
-            <a:pPr marL="285750" indent="-285750">
-              <a:buFont typeface="Arial" panose="020B0604020202020204" pitchFamily="34" charset="0"/>
-              <a:buChar char="•"/>
-            </a:pPr>
-            <a:r>
-              <a:rPr lang="en-US" dirty="0">
-                <a:solidFill>
-                  <a:srgbClr val="FF0000"/>
-                </a:solidFill>
-              </a:rPr>
-              <a:t>Statement: sentence that’s true or false</a:t>
-            </a:r>
-          </a:p>
-          <a:p>
-            <a:pPr marL="742950" lvl="1" indent="-285750">
-              <a:buFont typeface="Arial" panose="020B0604020202020204" pitchFamily="34" charset="0"/>
-              <a:buChar char="•"/>
-            </a:pPr>
-            <a:r>
-              <a:rPr lang="en-US" dirty="0"/>
-              <a:t>Example:   ∀ x ∈ S,  P(x).</a:t>
-            </a:r>
-          </a:p>
-          <a:p>
-            <a:pPr marL="742950" lvl="1" indent="-285750">
-              <a:buFont typeface="Arial" panose="020B0604020202020204" pitchFamily="34" charset="0"/>
-              <a:buChar char="•"/>
-            </a:pPr>
-            <a:r>
-              <a:rPr lang="en-US" dirty="0"/>
-              <a:t>What are the pieces in this example?</a:t>
-            </a:r>
-          </a:p>
-          <a:p>
-            <a:pPr marL="742950" lvl="1" indent="-285750">
-              <a:buFont typeface="Arial" panose="020B0604020202020204" pitchFamily="34" charset="0"/>
-              <a:buChar char="•"/>
-            </a:pPr>
-            <a:r>
-              <a:rPr lang="en-US" dirty="0">
-                <a:solidFill>
-                  <a:srgbClr val="FF0000"/>
-                </a:solidFill>
-              </a:rPr>
-              <a:t>Is this example an open sentence too?</a:t>
-            </a:r>
-          </a:p>
-          <a:p>
-            <a:pPr marL="285750" indent="-285750">
-              <a:buFont typeface="Arial" panose="020B0604020202020204" pitchFamily="34" charset="0"/>
-              <a:buChar char="•"/>
-            </a:pPr>
-            <a:endParaRPr lang="en-US" sz="1050" dirty="0">
-              <a:solidFill>
-                <a:srgbClr val="FF0000"/>
-              </a:solidFill>
-            </a:endParaRPr>
-          </a:p>
-          <a:p>
-            <a:pPr lvl="1"/>
-            <a:endParaRPr lang="en-US" b="1" dirty="0">
-              <a:solidFill>
-                <a:srgbClr val="00B0F0"/>
-              </a:solidFill>
-            </a:endParaRPr>
-          </a:p>
-          <a:p>
-            <a:pPr lvl="1"/>
-            <a:endParaRPr lang="en-US" dirty="0"/>
-          </a:p>
-        </p:txBody>
-      </p:sp>
-    </p:spTree>
-    <p:extLst>
-      <p:ext uri="{BB962C8B-B14F-4D97-AF65-F5344CB8AC3E}">
-        <p14:creationId xmlns:p14="http://schemas.microsoft.com/office/powerpoint/2010/main" val="2586876365"/>
-      </p:ext>
-    </p:extLst>
-  </p:cSld>
-  <p:clrMapOvr>
-    <a:masterClrMapping/>
-  </p:clrMapOvr>
-  <p:timing>
-    <p:tnLst>
-      <p:par>
-        <p:cTn id="1" dur="indefinite" restart="never" nodeType="tmRoot">
-          <p:childTnLst>
-            <p:seq concurrent="1" nextAc="seek">
-              <p:cTn id="2" dur="indefinite" nodeType="mainSeq">
-                <p:childTnLst>
-                  <p:par>
-                    <p:cTn id="3" fill="hold">
-                      <p:stCondLst>
-                        <p:cond delay="indefinite"/>
-                      </p:stCondLst>
-                      <p:childTnLst>
-                        <p:par>
-                          <p:cTn id="4" fill="hold">
-                            <p:stCondLst>
-                              <p:cond delay="0"/>
-                            </p:stCondLst>
-                            <p:childTnLst>
-                              <p:par>
-                                <p:cTn id="5" presetID="1" presetClass="entr" presetSubtype="0" fill="hold" nodeType="clickEffect">
-                                  <p:stCondLst>
-                                    <p:cond delay="0"/>
-                                  </p:stCondLst>
-                                  <p:childTnLst>
-                                    <p:set>
-                                      <p:cBhvr>
-                                        <p:cTn id="6" dur="1" fill="hold">
-                                          <p:stCondLst>
-                                            <p:cond delay="0"/>
-                                          </p:stCondLst>
-                                        </p:cTn>
-                                        <p:tgtEl>
-                                          <p:spTgt spid="4">
-                                            <p:txEl>
-                                              <p:pRg st="13" end="13"/>
-                                            </p:txEl>
-                                          </p:spTgt>
-                                        </p:tgtEl>
-                                        <p:attrNameLst>
-                                          <p:attrName>style.visibility</p:attrName>
-                                        </p:attrNameLst>
-                                      </p:cBhvr>
-                                      <p:to>
-                                        <p:strVal val="visible"/>
-                                      </p:to>
-                                    </p:set>
-                                  </p:childTnLst>
-                                </p:cTn>
-                              </p:par>
-                            </p:childTnLst>
-                          </p:cTn>
-                        </p:par>
-                      </p:childTnLst>
-                    </p:cTn>
-                  </p:par>
-                  <p:par>
-                    <p:cTn id="7" fill="hold">
-                      <p:stCondLst>
-                        <p:cond delay="indefinite"/>
-                      </p:stCondLst>
-                      <p:childTnLst>
-                        <p:par>
-                          <p:cTn id="8" fill="hold">
-                            <p:stCondLst>
-                              <p:cond delay="0"/>
-                            </p:stCondLst>
-                            <p:childTnLst>
-                              <p:par>
-                                <p:cTn id="9" presetID="1" presetClass="entr" presetSubtype="0" fill="hold" nodeType="clickEffect">
-                                  <p:stCondLst>
-                                    <p:cond delay="0"/>
-                                  </p:stCondLst>
-                                  <p:childTnLst>
-                                    <p:set>
-                                      <p:cBhvr>
-                                        <p:cTn id="10" dur="1" fill="hold">
-                                          <p:stCondLst>
-                                            <p:cond delay="0"/>
-                                          </p:stCondLst>
-                                        </p:cTn>
-                                        <p:tgtEl>
-                                          <p:spTgt spid="4">
-                                            <p:txEl>
-                                              <p:pRg st="14" end="14"/>
-                                            </p:txEl>
-                                          </p:spTgt>
-                                        </p:tgtEl>
-                                        <p:attrNameLst>
-                                          <p:attrName>style.visibility</p:attrName>
-                                        </p:attrNameLst>
-                                      </p:cBhvr>
-                                      <p:to>
-                                        <p:strVal val="visible"/>
-                                      </p:to>
-                                    </p:set>
-                                  </p:childTnLst>
-                                </p:cTn>
-                              </p:par>
-                            </p:childTnLst>
-                          </p:cTn>
-                        </p:par>
-                      </p:childTnLst>
-                    </p:cTn>
-                  </p:par>
-                  <p:par>
-                    <p:cTn id="11" fill="hold">
-                      <p:stCondLst>
-                        <p:cond delay="indefinite"/>
-                      </p:stCondLst>
-                      <p:childTnLst>
-                        <p:par>
-                          <p:cTn id="12" fill="hold">
-                            <p:stCondLst>
-                              <p:cond delay="0"/>
-                            </p:stCondLst>
-                            <p:childTnLst>
-                              <p:par>
-                                <p:cTn id="13" presetID="1" presetClass="entr" presetSubtype="0" fill="hold" nodeType="clickEffect">
-                                  <p:stCondLst>
-                                    <p:cond delay="0"/>
-                                  </p:stCondLst>
-                                  <p:childTnLst>
-                                    <p:set>
-                                      <p:cBhvr>
-                                        <p:cTn id="14" dur="1" fill="hold">
-                                          <p:stCondLst>
-                                            <p:cond delay="0"/>
-                                          </p:stCondLst>
-                                        </p:cTn>
-                                        <p:tgtEl>
-                                          <p:spTgt spid="4">
-                                            <p:txEl>
-                                              <p:pRg st="15" end="15"/>
-                                            </p:txEl>
-                                          </p:spTgt>
-                                        </p:tgtEl>
-                                        <p:attrNameLst>
-                                          <p:attrName>style.visibility</p:attrName>
-                                        </p:attrNameLst>
-                                      </p:cBhvr>
-                                      <p:to>
-                                        <p:strVal val="visible"/>
-                                      </p:to>
-                                    </p:set>
-                                  </p:childTnLst>
-                                </p:cTn>
-                              </p:par>
-                            </p:childTnLst>
-                          </p:cTn>
-                        </p:par>
-                      </p:childTnLst>
-                    </p:cTn>
-                  </p:par>
-                  <p:par>
-                    <p:cTn id="15" fill="hold">
-                      <p:stCondLst>
-                        <p:cond delay="indefinite"/>
-                      </p:stCondLst>
-                      <p:childTnLst>
-                        <p:par>
-                          <p:cTn id="16" fill="hold">
-                            <p:stCondLst>
-                              <p:cond delay="0"/>
-                            </p:stCondLst>
-                            <p:childTnLst>
-                              <p:par>
-                                <p:cTn id="17" presetID="1" presetClass="entr" presetSubtype="0" fill="hold" nodeType="clickEffect">
-                                  <p:stCondLst>
-                                    <p:cond delay="0"/>
-                                  </p:stCondLst>
-                                  <p:childTnLst>
-                                    <p:set>
-                                      <p:cBhvr>
-                                        <p:cTn id="18" dur="1" fill="hold">
-                                          <p:stCondLst>
-                                            <p:cond delay="0"/>
-                                          </p:stCondLst>
-                                        </p:cTn>
-                                        <p:tgtEl>
-                                          <p:spTgt spid="4">
-                                            <p:txEl>
-                                              <p:pRg st="16" end="16"/>
-                                            </p:txEl>
-                                          </p:spTgt>
-                                        </p:tgtEl>
-                                        <p:attrNameLst>
-                                          <p:attrName>style.visibility</p:attrName>
-                                        </p:attrNameLst>
-                                      </p:cBhvr>
-                                      <p:to>
-                                        <p:strVal val="visible"/>
-                                      </p:to>
-                                    </p:set>
-                                  </p:childTnLst>
-                                </p:cTn>
-                              </p:par>
-                            </p:childTnLst>
-                          </p:cTn>
-                        </p:par>
-                      </p:childTnLst>
-                    </p:cTn>
-                  </p:par>
-                </p:childTnLst>
-              </p:cTn>
-              <p:prevCondLst>
-                <p:cond evt="onPrev" delay="0">
-                  <p:tgtEl>
-                    <p:sldTgt/>
-                  </p:tgtEl>
-                </p:cond>
-              </p:prevCondLst>
-              <p:nextCondLst>
-                <p:cond evt="onNext" delay="0">
-                  <p:tgtEl>
-                    <p:sldTgt/>
-                  </p:tgtEl>
-                </p:cond>
-              </p:nextCondLst>
-            </p:seq>
-          </p:childTnLst>
-        </p:cTn>
-      </p:par>
-    </p:tnLst>
-  </p:timing>
-</p:sld>
-</file>
-
-<file path=ppt/slides/slide4.xml><?xml version="1.0" encoding="utf-8"?>
-<p:sld xmlns:a="http://schemas.openxmlformats.org/drawingml/2006/main" xmlns:r="http://schemas.openxmlformats.org/officeDocument/2006/relationships" xmlns:p="http://schemas.openxmlformats.org/presentationml/2006/main">
-  <p:cSld>
-    <p:spTree>
-      <p:nvGrpSpPr>
-        <p:cNvPr id="1" name=""/>
-        <p:cNvGrpSpPr/>
-        <p:nvPr/>
-      </p:nvGrpSpPr>
-      <p:grpSpPr>
-        <a:xfrm>
-          <a:off x="0" y="0"/>
-          <a:ext cx="0" cy="0"/>
-          <a:chOff x="0" y="0"/>
-          <a:chExt cx="0" cy="0"/>
-        </a:xfrm>
-      </p:grpSpPr>
-      <p:sp>
-        <p:nvSpPr>
-          <p:cNvPr id="2" name="Title 1">
-            <a:extLst>
-              <a:ext uri="{FF2B5EF4-FFF2-40B4-BE49-F238E27FC236}">
-                <a16:creationId xmlns:a16="http://schemas.microsoft.com/office/drawing/2014/main" id="{3DFDFE6E-0F70-4498-A727-114AF49CE2A5}"/>
-              </a:ext>
-            </a:extLst>
-          </p:cNvPr>
-          <p:cNvSpPr>
-            <a:spLocks noGrp="1"/>
-          </p:cNvSpPr>
-          <p:nvPr>
-            <p:ph type="ctrTitle"/>
-          </p:nvPr>
-        </p:nvSpPr>
-        <p:spPr>
-          <a:xfrm>
-            <a:off x="366318" y="427839"/>
-            <a:ext cx="10472257" cy="3236053"/>
-          </a:xfrm>
-        </p:spPr>
-        <p:txBody>
-          <a:bodyPr>
-            <a:normAutofit/>
-          </a:bodyPr>
-          <a:lstStyle/>
-          <a:p>
-            <a:br>
-              <a:rPr lang="en-US" dirty="0"/>
-            </a:br>
-            <a:br>
-              <a:rPr lang="en-US" dirty="0"/>
-            </a:br>
-            <a:endParaRPr lang="en-US" dirty="0"/>
-          </a:p>
-        </p:txBody>
-      </p:sp>
-      <p:sp>
-        <p:nvSpPr>
-          <p:cNvPr id="3" name="Subtitle 2">
-            <a:extLst>
-              <a:ext uri="{FF2B5EF4-FFF2-40B4-BE49-F238E27FC236}">
-                <a16:creationId xmlns:a16="http://schemas.microsoft.com/office/drawing/2014/main" id="{B9191896-C725-462F-BB08-4D8D8507E31D}"/>
-              </a:ext>
-            </a:extLst>
-          </p:cNvPr>
-          <p:cNvSpPr>
-            <a:spLocks noGrp="1"/>
-          </p:cNvSpPr>
-          <p:nvPr>
-            <p:ph type="subTitle" idx="1"/>
-          </p:nvPr>
-        </p:nvSpPr>
-        <p:spPr>
-          <a:xfrm>
-            <a:off x="159391" y="85471"/>
-            <a:ext cx="11785133" cy="827349"/>
-          </a:xfrm>
-        </p:spPr>
-        <p:txBody>
-          <a:bodyPr>
-            <a:normAutofit/>
-          </a:bodyPr>
-          <a:lstStyle/>
-          <a:p>
-            <a:r>
-              <a:rPr lang="en-US" sz="4400" dirty="0"/>
-              <a:t>Tips for Assignment 1!</a:t>
-            </a:r>
-          </a:p>
-        </p:txBody>
-      </p:sp>
-      <p:sp>
-        <p:nvSpPr>
-          <p:cNvPr id="4" name="TextBox 3">
-            <a:extLst>
-              <a:ext uri="{FF2B5EF4-FFF2-40B4-BE49-F238E27FC236}">
-                <a16:creationId xmlns:a16="http://schemas.microsoft.com/office/drawing/2014/main" id="{0E4E45B2-07CC-43F3-92B9-C70644650306}"/>
-              </a:ext>
-            </a:extLst>
-          </p:cNvPr>
-          <p:cNvSpPr txBox="1"/>
-          <p:nvPr/>
-        </p:nvSpPr>
-        <p:spPr>
-          <a:xfrm>
-            <a:off x="159391" y="912820"/>
-            <a:ext cx="11697050" cy="7048083"/>
-          </a:xfrm>
-          <a:prstGeom prst="rect">
-            <a:avLst/>
-          </a:prstGeom>
-          <a:noFill/>
-        </p:spPr>
-        <p:txBody>
-          <a:bodyPr wrap="square" rtlCol="0">
-            <a:spAutoFit/>
-          </a:bodyPr>
-          <a:lstStyle/>
-          <a:p>
-            <a:pPr marL="285750" indent="-285750">
-              <a:buFont typeface="Arial" panose="020B0604020202020204" pitchFamily="34" charset="0"/>
-              <a:buChar char="•"/>
-            </a:pPr>
-            <a:r>
-              <a:rPr lang="en-US" dirty="0"/>
               <a:t>Follow instructions perfectly. </a:t>
             </a:r>
           </a:p>
@@ -4510,7 +4344,7 @@
             </a:pPr>
             <a:r>
               <a:rPr lang="en-US" dirty="0"/>
-              <a:t>Table 1.4.3 is important!</a:t>
+              <a:t>Section 1.4.3 is important!</a:t>
             </a:r>
           </a:p>
           <a:p>
@@ -4616,7 +4450,15 @@
             </a:r>
             <a:r>
               <a:rPr lang="en-US" dirty="0"/>
-              <a:t>, but many will be the same since things like x^2 are the same for x=-2,+2</a:t>
+              <a:t>, but many will be the same since things like x</a:t>
+            </a:r>
+            <a:r>
+              <a:rPr lang="en-US" baseline="30000" dirty="0"/>
+              <a:t>2</a:t>
+            </a:r>
+            <a:r>
+              <a:rPr lang="en-US" dirty="0"/>
+              <a:t> are the same for x=-2,+2</a:t>
             </a:r>
           </a:p>
           <a:p>
@@ -4670,7 +4512,7 @@
             </a:pPr>
             <a:r>
               <a:rPr lang="en-US" dirty="0"/>
-              <a:t>“Truth value” of a statement is just , whether the statement is true (Truth value = “True”) or false (Truth value = “False”)</a:t>
+              <a:t>“Truth value” of a statement is just, whether the statement is false (Truth value = “False”) or true (Truth value = “True”)</a:t>
             </a:r>
           </a:p>
           <a:p>
@@ -4729,6 +4571,35 @@
                 <a:srgbClr val="FF0000"/>
               </a:solidFill>
             </a:endParaRPr>
+          </a:p>
+        </p:txBody>
+      </p:sp>
+      <p:sp>
+        <p:nvSpPr>
+          <p:cNvPr id="5" name="Footer Placeholder 4">
+            <a:extLst>
+              <a:ext uri="{FF2B5EF4-FFF2-40B4-BE49-F238E27FC236}">
+                <a16:creationId xmlns:a16="http://schemas.microsoft.com/office/drawing/2014/main" id="{2D997F5D-36A7-4269-AE63-F04D01F70690}"/>
+              </a:ext>
+            </a:extLst>
+          </p:cNvPr>
+          <p:cNvSpPr>
+            <a:spLocks noGrp="1"/>
+          </p:cNvSpPr>
+          <p:nvPr>
+            <p:ph type="ftr" sz="quarter" idx="11"/>
+          </p:nvPr>
+        </p:nvSpPr>
+        <p:spPr/>
+        <p:txBody>
+          <a:bodyPr/>
+          <a:lstStyle/>
+          <a:p>
+            <a:r>
+              <a:rPr lang="sv-SE"/>
+              <a:t>Dr. Nike Dattani, MATH 135, Fall 2021</a:t>
+            </a:r>
+            <a:endParaRPr lang="en-US"/>
           </a:p>
         </p:txBody>
       </p:sp>
@@ -5490,7 +5361,7 @@
 </p:sld>
 </file>
 
-<file path=ppt/slides/slide5.xml><?xml version="1.0" encoding="utf-8"?>
+<file path=ppt/slides/slide4.xml><?xml version="1.0" encoding="utf-8"?>
 <p:sld xmlns:a="http://schemas.openxmlformats.org/drawingml/2006/main" xmlns:r="http://schemas.openxmlformats.org/officeDocument/2006/relationships" xmlns:p="http://schemas.openxmlformats.org/presentationml/2006/main">
   <p:cSld>
     <p:spTree>
@@ -5575,7 +5446,7 @@
           <a:p>
             <a:r>
               <a:rPr lang="en-US" sz="4400" dirty="0"/>
-              <a:t>Please get perfect on this assignment!</a:t>
+              <a:t>Aiming for perfection on assignments</a:t>
             </a:r>
           </a:p>
         </p:txBody>
@@ -5645,6 +5516,35 @@
               </a:rPr>
               <a:t>When you’re studying for the exam, you will wish you knew everything from the assignments.</a:t>
             </a:r>
+          </a:p>
+        </p:txBody>
+      </p:sp>
+      <p:sp>
+        <p:nvSpPr>
+          <p:cNvPr id="5" name="Footer Placeholder 4">
+            <a:extLst>
+              <a:ext uri="{FF2B5EF4-FFF2-40B4-BE49-F238E27FC236}">
+                <a16:creationId xmlns:a16="http://schemas.microsoft.com/office/drawing/2014/main" id="{630B6828-6A7B-46AD-AC5A-AE86867B83F5}"/>
+              </a:ext>
+            </a:extLst>
+          </p:cNvPr>
+          <p:cNvSpPr>
+            <a:spLocks noGrp="1"/>
+          </p:cNvSpPr>
+          <p:nvPr>
+            <p:ph type="ftr" sz="quarter" idx="11"/>
+          </p:nvPr>
+        </p:nvSpPr>
+        <p:spPr/>
+        <p:txBody>
+          <a:bodyPr/>
+          <a:lstStyle/>
+          <a:p>
+            <a:r>
+              <a:rPr lang="sv-SE" dirty="0"/>
+              <a:t>Dr. Nike Dattani, MATH 135, Fall 2021</a:t>
+            </a:r>
+            <a:endParaRPr lang="en-US" dirty="0"/>
           </a:p>
         </p:txBody>
       </p:sp>
@@ -5789,7 +5689,7 @@
 </p:sld>
 </file>
 
-<file path=ppt/slides/slide6.xml><?xml version="1.0" encoding="utf-8"?>
+<file path=ppt/slides/slide5.xml><?xml version="1.0" encoding="utf-8"?>
 <p:sld xmlns:a="http://schemas.openxmlformats.org/drawingml/2006/main" xmlns:r="http://schemas.openxmlformats.org/officeDocument/2006/relationships" xmlns:p="http://schemas.openxmlformats.org/presentationml/2006/main">
   <p:cSld>
     <p:spTree>
@@ -5873,8 +5773,16 @@
           <a:lstStyle/>
           <a:p>
             <a:r>
-              <a:rPr lang="en-US" sz="4400" dirty="0"/>
-              <a:t>Proof practice!</a:t>
+              <a:rPr lang="en-US" sz="2800" u="sng" dirty="0"/>
+              <a:t>If a number’s last digit is 5, then is the last digit of its square </a:t>
+            </a:r>
+            <a:r>
+              <a:rPr lang="en-US" sz="2800" i="1" u="sng" dirty="0"/>
+              <a:t>always</a:t>
+            </a:r>
+            <a:r>
+              <a:rPr lang="en-US" sz="2800" u="sng" dirty="0"/>
+              <a:t> 5?</a:t>
             </a:r>
           </a:p>
         </p:txBody>
@@ -5893,8 +5801,8 @@
         </p:nvSpPr>
         <p:spPr>
           <a:xfrm>
-            <a:off x="477194" y="1045985"/>
-            <a:ext cx="11697050" cy="6924973"/>
+            <a:off x="3494809" y="1110247"/>
+            <a:ext cx="11697050" cy="7140416"/>
           </a:xfrm>
           <a:prstGeom prst="rect">
             <a:avLst/>
@@ -5909,11 +5817,11 @@
           <a:p>
             <a:r>
               <a:rPr lang="en-US" sz="2400" dirty="0"/>
-              <a:t>S =  {Integers ending in 5}</a:t>
-            </a:r>
-          </a:p>
-          <a:p>
-            <a:endParaRPr lang="en-US" sz="2400" dirty="0"/>
+              <a:t>S =  {Integers for which the last digit is 5}</a:t>
+            </a:r>
+          </a:p>
+          <a:p>
+            <a:endParaRPr lang="en-US" sz="1400" dirty="0"/>
           </a:p>
           <a:p>
             <a:r>
@@ -5926,7 +5834,15 @@
             </a:r>
             <a:r>
               <a:rPr lang="en-US" sz="2400" dirty="0"/>
-              <a:t> S  ,  N^2 </a:t>
+              <a:t> S  ,  N</a:t>
+            </a:r>
+            <a:r>
+              <a:rPr lang="en-US" sz="2400" baseline="30000" dirty="0"/>
+              <a:t>2</a:t>
+            </a:r>
+            <a:r>
+              <a:rPr lang="en-US" sz="2400" dirty="0"/>
+              <a:t> </a:t>
             </a:r>
             <a:r>
               <a:rPr lang="el-GR" sz="2400" dirty="0"/>
@@ -5934,16 +5850,19 @@
             </a:r>
             <a:r>
               <a:rPr lang="en-US" sz="2400" dirty="0"/>
-              <a:t> S</a:t>
+              <a:t> S ?</a:t>
             </a:r>
           </a:p>
           <a:p>
             <a:endParaRPr lang="en-US" sz="2400" dirty="0"/>
           </a:p>
           <a:p>
+            <a:endParaRPr lang="en-US" sz="2400" dirty="0"/>
+          </a:p>
+          <a:p>
             <a:r>
               <a:rPr lang="en-US" sz="2400" dirty="0"/>
-              <a:t>Ɐ N,  ∃ a </a:t>
+              <a:t>Ɐ N </a:t>
             </a:r>
             <a:r>
               <a:rPr lang="el-GR" sz="2400" dirty="0"/>
@@ -5951,7 +5870,23 @@
             </a:r>
             <a:r>
               <a:rPr lang="en-US" sz="2400" dirty="0"/>
-              <a:t> ℤ  ∋ N = 10a +5</a:t>
+              <a:t> S,  ∃ a </a:t>
+            </a:r>
+            <a:r>
+              <a:rPr lang="el-GR" sz="2400" dirty="0"/>
+              <a:t>ϵ</a:t>
+            </a:r>
+            <a:r>
+              <a:rPr lang="en-US" sz="2400" dirty="0"/>
+              <a:t> ℤ  </a:t>
+            </a:r>
+            <a:r>
+              <a:rPr lang="en-US" sz="2400" dirty="0" err="1"/>
+              <a:t>s.t.</a:t>
+            </a:r>
+            <a:r>
+              <a:rPr lang="en-US" sz="2400" dirty="0"/>
+              <a:t> N = 10a +5</a:t>
             </a:r>
           </a:p>
           <a:p>
@@ -5960,13 +5895,37 @@
           <a:p>
             <a:r>
               <a:rPr lang="en-US" sz="2400" dirty="0"/>
-              <a:t>(10a + 5)^2 = 100a^2 + 100a + 25</a:t>
-            </a:r>
-          </a:p>
-          <a:p>
+              <a:t>(10a + 5)</a:t>
+            </a:r>
+            <a:r>
+              <a:rPr lang="en-US" sz="2400" baseline="30000" dirty="0"/>
+              <a:t>2</a:t>
+            </a:r>
             <a:r>
               <a:rPr lang="en-US" sz="2400" dirty="0"/>
-              <a:t>                     = 100a(a+1) + 25</a:t>
+              <a:t> = 100a</a:t>
+            </a:r>
+            <a:r>
+              <a:rPr lang="en-US" sz="2400" baseline="30000" dirty="0"/>
+              <a:t>2</a:t>
+            </a:r>
+            <a:r>
+              <a:rPr lang="en-US" sz="2400" dirty="0"/>
+              <a:t> + 100a + 25</a:t>
+            </a:r>
+          </a:p>
+          <a:p>
+            <a:r>
+              <a:rPr lang="en-US" sz="2400" dirty="0"/>
+              <a:t>                  </a:t>
+            </a:r>
+            <a:r>
+              <a:rPr lang="en-US" sz="1050" dirty="0"/>
+              <a:t> </a:t>
+            </a:r>
+            <a:r>
+              <a:rPr lang="en-US" sz="2400" dirty="0"/>
+              <a:t>= 100a(a+1) + 25</a:t>
             </a:r>
           </a:p>
           <a:p>
@@ -5986,7 +5945,23 @@
             </a:r>
             <a:r>
               <a:rPr lang="en-US" sz="2400" dirty="0"/>
-              <a:t> ℤ  ∋ N^2 = 100b + 25</a:t>
+              <a:t> ℤ  </a:t>
+            </a:r>
+            <a:r>
+              <a:rPr lang="en-US" sz="2400" dirty="0" err="1"/>
+              <a:t>s.t.</a:t>
+            </a:r>
+            <a:r>
+              <a:rPr lang="en-US" sz="2400" dirty="0"/>
+              <a:t> N</a:t>
+            </a:r>
+            <a:r>
+              <a:rPr lang="en-US" sz="2400" baseline="30000" dirty="0"/>
+              <a:t>2 </a:t>
+            </a:r>
+            <a:r>
+              <a:rPr lang="en-US" sz="2400" dirty="0"/>
+              <a:t>= 100b + 25</a:t>
             </a:r>
           </a:p>
           <a:p>
@@ -6011,7 +5986,7 @@
             </a:r>
             <a:r>
               <a:rPr lang="en-US" sz="2400" dirty="0"/>
-              <a:t> ℤ</a:t>
+              <a:t> S</a:t>
             </a:r>
           </a:p>
           <a:p>
@@ -6020,7 +5995,15 @@
           <a:p>
             <a:r>
               <a:rPr lang="en-US" sz="2400" dirty="0"/>
-              <a:t>∴  N^2 </a:t>
+              <a:t>∴  N</a:t>
+            </a:r>
+            <a:r>
+              <a:rPr lang="en-US" sz="2400" baseline="30000" dirty="0"/>
+              <a:t>2</a:t>
+            </a:r>
+            <a:r>
+              <a:rPr lang="en-US" sz="2400" dirty="0"/>
+              <a:t> </a:t>
             </a:r>
             <a:r>
               <a:rPr lang="el-GR" sz="2400" dirty="0"/>
@@ -6079,10 +6062,47 @@
           </a:p>
         </p:txBody>
       </p:sp>
+      <p:cxnSp>
+        <p:nvCxnSpPr>
+          <p:cNvPr id="6" name="Straight Connector 5">
+            <a:extLst>
+              <a:ext uri="{FF2B5EF4-FFF2-40B4-BE49-F238E27FC236}">
+                <a16:creationId xmlns:a16="http://schemas.microsoft.com/office/drawing/2014/main" id="{5E5783D7-9C70-481A-91DA-D89300F2CF8D}"/>
+              </a:ext>
+            </a:extLst>
+          </p:cNvPr>
+          <p:cNvCxnSpPr/>
+          <p:nvPr/>
+        </p:nvCxnSpPr>
+        <p:spPr>
+          <a:xfrm>
+            <a:off x="366318" y="2327564"/>
+            <a:ext cx="11003973" cy="0"/>
+          </a:xfrm>
+          <a:prstGeom prst="line">
+            <a:avLst/>
+          </a:prstGeom>
+          <a:ln w="38100"/>
+        </p:spPr>
+        <p:style>
+          <a:lnRef idx="1">
+            <a:schemeClr val="accent1"/>
+          </a:lnRef>
+          <a:fillRef idx="0">
+            <a:schemeClr val="accent1"/>
+          </a:fillRef>
+          <a:effectRef idx="0">
+            <a:schemeClr val="accent1"/>
+          </a:effectRef>
+          <a:fontRef idx="minor">
+            <a:schemeClr val="tx1"/>
+          </a:fontRef>
+        </p:style>
+      </p:cxnSp>
     </p:spTree>
     <p:extLst>
       <p:ext uri="{BB962C8B-B14F-4D97-AF65-F5344CB8AC3E}">
-        <p14:creationId xmlns:p14="http://schemas.microsoft.com/office/powerpoint/2010/main" val="135307981"/>
+        <p14:creationId xmlns:p14="http://schemas.microsoft.com/office/powerpoint/2010/main" val="934773067"/>
       </p:ext>
     </p:extLst>
   </p:cSld>
@@ -6189,6 +6209,33 @@
                                   </p:childTnLst>
                                 </p:cTn>
                               </p:par>
+                              <p:par>
+                                <p:cTn id="11" presetID="1" presetClass="entr" presetSubtype="0" fill="hold" nodeType="withEffect">
+                                  <p:stCondLst>
+                                    <p:cond delay="0"/>
+                                  </p:stCondLst>
+                                  <p:childTnLst>
+                                    <p:set>
+                                      <p:cBhvr>
+                                        <p:cTn id="12" dur="1" fill="hold">
+                                          <p:stCondLst>
+                                            <p:cond delay="0"/>
+                                          </p:stCondLst>
+                                        </p:cTn>
+                                        <p:tgtEl>
+                                          <p:spTgt spid="6"/>
+                                        </p:tgtEl>
+                                        <p:attrNameLst>
+                                          <p:attrName>style.visibility</p:attrName>
+                                        </p:attrNameLst>
+                                      </p:cBhvr>
+                                      <p:to>
+                                        <p:strVal val="visible"/>
+                                      </p:to>
+                                    </p:set>
+                                  </p:childTnLst>
+                                </p:cTn>
+                              </p:par>
                             </p:childTnLst>
                           </p:cTn>
                         </p:par>
@@ -6196,26 +6243,26 @@
                     </p:cTn>
                   </p:par>
                   <p:par>
-                    <p:cTn id="11" fill="hold">
+                    <p:cTn id="13" fill="hold">
                       <p:stCondLst>
                         <p:cond delay="indefinite"/>
                       </p:stCondLst>
                       <p:childTnLst>
                         <p:par>
-                          <p:cTn id="12" fill="hold">
+                          <p:cTn id="14" fill="hold">
                             <p:stCondLst>
                               <p:cond delay="0"/>
                             </p:stCondLst>
                             <p:childTnLst>
                               <p:par>
-                                <p:cTn id="13" presetID="1" presetClass="entr" presetSubtype="0" fill="hold" nodeType="clickEffect">
+                                <p:cTn id="15" presetID="1" presetClass="entr" presetSubtype="0" fill="hold" nodeType="clickEffect">
                                   <p:stCondLst>
                                     <p:cond delay="0"/>
                                   </p:stCondLst>
                                   <p:childTnLst>
                                     <p:set>
                                       <p:cBhvr>
-                                        <p:cTn id="14" dur="1" fill="hold">
+                                        <p:cTn id="16" dur="1" fill="hold">
                                           <p:stCondLst>
                                             <p:cond delay="0"/>
                                           </p:stCondLst>
@@ -6223,7 +6270,7 @@
                                         <p:tgtEl>
                                           <p:spTgt spid="4">
                                             <p:txEl>
-                                              <p:pRg st="4" end="4"/>
+                                              <p:pRg st="5" end="5"/>
                                             </p:txEl>
                                           </p:spTgt>
                                         </p:tgtEl>
@@ -6245,75 +6292,26 @@
                     </p:cTn>
                   </p:par>
                   <p:par>
-                    <p:cTn id="15" fill="hold">
+                    <p:cTn id="17" fill="hold">
                       <p:stCondLst>
                         <p:cond delay="indefinite"/>
                       </p:stCondLst>
                       <p:childTnLst>
                         <p:par>
-                          <p:cTn id="16" fill="hold">
+                          <p:cTn id="18" fill="hold">
                             <p:stCondLst>
                               <p:cond delay="0"/>
                             </p:stCondLst>
                             <p:childTnLst>
                               <p:par>
-                                <p:cTn id="17" presetID="1" presetClass="entr" presetSubtype="0" fill="hold" nodeType="clickEffect">
+                                <p:cTn id="19" presetID="1" presetClass="entr" presetSubtype="0" fill="hold" nodeType="clickEffect">
                                   <p:stCondLst>
                                     <p:cond delay="0"/>
                                   </p:stCondLst>
                                   <p:childTnLst>
                                     <p:set>
                                       <p:cBhvr>
-                                        <p:cTn id="18" dur="1" fill="hold">
-                                          <p:stCondLst>
-                                            <p:cond delay="0"/>
-                                          </p:stCondLst>
-                                        </p:cTn>
-                                        <p:tgtEl>
-                                          <p:spTgt spid="4">
-                                            <p:txEl>
-                                              <p:pRg st="6" end="6"/>
-                                            </p:txEl>
-                                          </p:spTgt>
-                                        </p:tgtEl>
-                                        <p:attrNameLst>
-                                          <p:attrName>style.visibility</p:attrName>
-                                        </p:attrNameLst>
-                                      </p:cBhvr>
-                                      <p:to>
-                                        <p:strVal val="visible"/>
-                                      </p:to>
-                                    </p:set>
-                                  </p:childTnLst>
-                                </p:cTn>
-                              </p:par>
-                            </p:childTnLst>
-                          </p:cTn>
-                        </p:par>
-                      </p:childTnLst>
-                    </p:cTn>
-                  </p:par>
-                  <p:par>
-                    <p:cTn id="19" fill="hold">
-                      <p:stCondLst>
-                        <p:cond delay="indefinite"/>
-                      </p:stCondLst>
-                      <p:childTnLst>
-                        <p:par>
-                          <p:cTn id="20" fill="hold">
-                            <p:stCondLst>
-                              <p:cond delay="0"/>
-                            </p:stCondLst>
-                            <p:childTnLst>
-                              <p:par>
-                                <p:cTn id="21" presetID="1" presetClass="entr" presetSubtype="0" fill="hold" nodeType="clickEffect">
-                                  <p:stCondLst>
-                                    <p:cond delay="0"/>
-                                  </p:stCondLst>
-                                  <p:childTnLst>
-                                    <p:set>
-                                      <p:cBhvr>
-                                        <p:cTn id="22" dur="1" fill="hold">
+                                        <p:cTn id="20" dur="1" fill="hold">
                                           <p:stCondLst>
                                             <p:cond delay="0"/>
                                           </p:stCondLst>
@@ -6343,26 +6341,26 @@
                     </p:cTn>
                   </p:par>
                   <p:par>
-                    <p:cTn id="23" fill="hold">
+                    <p:cTn id="21" fill="hold">
                       <p:stCondLst>
                         <p:cond delay="indefinite"/>
                       </p:stCondLst>
                       <p:childTnLst>
                         <p:par>
-                          <p:cTn id="24" fill="hold">
+                          <p:cTn id="22" fill="hold">
                             <p:stCondLst>
                               <p:cond delay="0"/>
                             </p:stCondLst>
                             <p:childTnLst>
                               <p:par>
-                                <p:cTn id="25" presetID="1" presetClass="entr" presetSubtype="0" fill="hold" nodeType="clickEffect">
+                                <p:cTn id="23" presetID="1" presetClass="entr" presetSubtype="0" fill="hold" nodeType="clickEffect">
                                   <p:stCondLst>
                                     <p:cond delay="0"/>
                                   </p:stCondLst>
                                   <p:childTnLst>
                                     <p:set>
                                       <p:cBhvr>
-                                        <p:cTn id="26" dur="1" fill="hold">
+                                        <p:cTn id="24" dur="1" fill="hold">
                                           <p:stCondLst>
                                             <p:cond delay="0"/>
                                           </p:stCondLst>
@@ -6392,26 +6390,26 @@
                     </p:cTn>
                   </p:par>
                   <p:par>
-                    <p:cTn id="27" fill="hold">
+                    <p:cTn id="25" fill="hold">
                       <p:stCondLst>
                         <p:cond delay="indefinite"/>
                       </p:stCondLst>
                       <p:childTnLst>
                         <p:par>
-                          <p:cTn id="28" fill="hold">
+                          <p:cTn id="26" fill="hold">
                             <p:stCondLst>
                               <p:cond delay="0"/>
                             </p:stCondLst>
                             <p:childTnLst>
                               <p:par>
-                                <p:cTn id="29" presetID="1" presetClass="entr" presetSubtype="0" fill="hold" nodeType="clickEffect">
+                                <p:cTn id="27" presetID="1" presetClass="entr" presetSubtype="0" fill="hold" nodeType="clickEffect">
                                   <p:stCondLst>
                                     <p:cond delay="0"/>
                                   </p:stCondLst>
                                   <p:childTnLst>
                                     <p:set>
                                       <p:cBhvr>
-                                        <p:cTn id="30" dur="1" fill="hold">
+                                        <p:cTn id="28" dur="1" fill="hold">
                                           <p:stCondLst>
                                             <p:cond delay="0"/>
                                           </p:stCondLst>
@@ -6441,862 +6439,32 @@
                     </p:cTn>
                   </p:par>
                   <p:par>
-                    <p:cTn id="31" fill="hold">
+                    <p:cTn id="29" fill="hold">
                       <p:stCondLst>
                         <p:cond delay="indefinite"/>
                       </p:stCondLst>
                       <p:childTnLst>
                         <p:par>
-                          <p:cTn id="32" fill="hold">
+                          <p:cTn id="30" fill="hold">
                             <p:stCondLst>
                               <p:cond delay="0"/>
                             </p:stCondLst>
                             <p:childTnLst>
                               <p:par>
-                                <p:cTn id="33" presetID="1" presetClass="entr" presetSubtype="0" fill="hold" nodeType="clickEffect">
+                                <p:cTn id="31" presetID="1" presetClass="entr" presetSubtype="0" fill="hold" nodeType="clickEffect">
                                   <p:stCondLst>
                                     <p:cond delay="0"/>
                                   </p:stCondLst>
                                   <p:childTnLst>
                                     <p:set>
                                       <p:cBhvr>
-                                        <p:cTn id="34" dur="1" fill="hold">
+                                        <p:cTn id="32" dur="1" fill="hold">
                                           <p:stCondLst>
                                             <p:cond delay="0"/>
                                           </p:stCondLst>
                                         </p:cTn>
                                         <p:tgtEl>
                                           <p:spTgt spid="4">
-                                            <p:txEl>
-                                              <p:pRg st="11" end="11"/>
-                                            </p:txEl>
-                                          </p:spTgt>
-                                        </p:tgtEl>
-                                        <p:attrNameLst>
-                                          <p:attrName>style.visibility</p:attrName>
-                                        </p:attrNameLst>
-                                      </p:cBhvr>
-                                      <p:to>
-                                        <p:strVal val="visible"/>
-                                      </p:to>
-                                    </p:set>
-                                  </p:childTnLst>
-                                </p:cTn>
-                              </p:par>
-                            </p:childTnLst>
-                          </p:cTn>
-                        </p:par>
-                      </p:childTnLst>
-                    </p:cTn>
-                  </p:par>
-                  <p:par>
-                    <p:cTn id="35" fill="hold">
-                      <p:stCondLst>
-                        <p:cond delay="indefinite"/>
-                      </p:stCondLst>
-                      <p:childTnLst>
-                        <p:par>
-                          <p:cTn id="36" fill="hold">
-                            <p:stCondLst>
-                              <p:cond delay="0"/>
-                            </p:stCondLst>
-                            <p:childTnLst>
-                              <p:par>
-                                <p:cTn id="37" presetID="1" presetClass="entr" presetSubtype="0" fill="hold" nodeType="clickEffect">
-                                  <p:stCondLst>
-                                    <p:cond delay="0"/>
-                                  </p:stCondLst>
-                                  <p:childTnLst>
-                                    <p:set>
-                                      <p:cBhvr>
-                                        <p:cTn id="38" dur="1" fill="hold">
-                                          <p:stCondLst>
-                                            <p:cond delay="0"/>
-                                          </p:stCondLst>
-                                        </p:cTn>
-                                        <p:tgtEl>
-                                          <p:spTgt spid="4">
-                                            <p:txEl>
-                                              <p:pRg st="13" end="13"/>
-                                            </p:txEl>
-                                          </p:spTgt>
-                                        </p:tgtEl>
-                                        <p:attrNameLst>
-                                          <p:attrName>style.visibility</p:attrName>
-                                        </p:attrNameLst>
-                                      </p:cBhvr>
-                                      <p:to>
-                                        <p:strVal val="visible"/>
-                                      </p:to>
-                                    </p:set>
-                                  </p:childTnLst>
-                                </p:cTn>
-                              </p:par>
-                            </p:childTnLst>
-                          </p:cTn>
-                        </p:par>
-                      </p:childTnLst>
-                    </p:cTn>
-                  </p:par>
-                </p:childTnLst>
-              </p:cTn>
-              <p:prevCondLst>
-                <p:cond evt="onPrev" delay="0">
-                  <p:tgtEl>
-                    <p:sldTgt/>
-                  </p:tgtEl>
-                </p:cond>
-              </p:prevCondLst>
-              <p:nextCondLst>
-                <p:cond evt="onNext" delay="0">
-                  <p:tgtEl>
-                    <p:sldTgt/>
-                  </p:tgtEl>
-                </p:cond>
-              </p:nextCondLst>
-            </p:seq>
-          </p:childTnLst>
-        </p:cTn>
-      </p:par>
-    </p:tnLst>
-  </p:timing>
-</p:sld>
-</file>
-
-<file path=ppt/slides/slide7.xml><?xml version="1.0" encoding="utf-8"?>
-<p:sld xmlns:a="http://schemas.openxmlformats.org/drawingml/2006/main" xmlns:r="http://schemas.openxmlformats.org/officeDocument/2006/relationships" xmlns:p="http://schemas.openxmlformats.org/presentationml/2006/main">
-  <p:cSld>
-    <p:spTree>
-      <p:nvGrpSpPr>
-        <p:cNvPr id="1" name=""/>
-        <p:cNvGrpSpPr/>
-        <p:nvPr/>
-      </p:nvGrpSpPr>
-      <p:grpSpPr>
-        <a:xfrm>
-          <a:off x="0" y="0"/>
-          <a:ext cx="0" cy="0"/>
-          <a:chOff x="0" y="0"/>
-          <a:chExt cx="0" cy="0"/>
-        </a:xfrm>
-      </p:grpSpPr>
-      <p:sp>
-        <p:nvSpPr>
-          <p:cNvPr id="2" name="Title 1">
-            <a:extLst>
-              <a:ext uri="{FF2B5EF4-FFF2-40B4-BE49-F238E27FC236}">
-                <a16:creationId xmlns:a16="http://schemas.microsoft.com/office/drawing/2014/main" id="{3DFDFE6E-0F70-4498-A727-114AF49CE2A5}"/>
-              </a:ext>
-            </a:extLst>
-          </p:cNvPr>
-          <p:cNvSpPr>
-            <a:spLocks noGrp="1"/>
-          </p:cNvSpPr>
-          <p:nvPr>
-            <p:ph type="ctrTitle"/>
-          </p:nvPr>
-        </p:nvSpPr>
-        <p:spPr>
-          <a:xfrm>
-            <a:off x="366318" y="427839"/>
-            <a:ext cx="10472257" cy="3236053"/>
-          </a:xfrm>
-        </p:spPr>
-        <p:txBody>
-          <a:bodyPr>
-            <a:normAutofit/>
-          </a:bodyPr>
-          <a:lstStyle/>
-          <a:p>
-            <a:br>
-              <a:rPr lang="en-US" dirty="0"/>
-            </a:br>
-            <a:br>
-              <a:rPr lang="en-US" dirty="0"/>
-            </a:br>
-            <a:endParaRPr lang="en-US" dirty="0"/>
-          </a:p>
-        </p:txBody>
-      </p:sp>
-      <p:pic>
-        <p:nvPicPr>
-          <p:cNvPr id="5" name="Picture 4">
-            <a:extLst>
-              <a:ext uri="{FF2B5EF4-FFF2-40B4-BE49-F238E27FC236}">
-                <a16:creationId xmlns:a16="http://schemas.microsoft.com/office/drawing/2014/main" id="{E475AB6A-1A1B-4319-B243-BBDD1AB35CD6}"/>
-              </a:ext>
-            </a:extLst>
-          </p:cNvPr>
-          <p:cNvPicPr>
-            <a:picLocks noChangeAspect="1"/>
-          </p:cNvPicPr>
-          <p:nvPr/>
-        </p:nvPicPr>
-        <p:blipFill>
-          <a:blip r:embed="rId2"/>
-          <a:stretch>
-            <a:fillRect/>
-          </a:stretch>
-        </p:blipFill>
-        <p:spPr>
-          <a:xfrm>
-            <a:off x="1524000" y="325924"/>
-            <a:ext cx="8957163" cy="6206152"/>
-          </a:xfrm>
-          <a:prstGeom prst="rect">
-            <a:avLst/>
-          </a:prstGeom>
-        </p:spPr>
-      </p:pic>
-    </p:spTree>
-    <p:extLst>
-      <p:ext uri="{BB962C8B-B14F-4D97-AF65-F5344CB8AC3E}">
-        <p14:creationId xmlns:p14="http://schemas.microsoft.com/office/powerpoint/2010/main" val="919743219"/>
-      </p:ext>
-    </p:extLst>
-  </p:cSld>
-  <p:clrMapOvr>
-    <a:masterClrMapping/>
-  </p:clrMapOvr>
-</p:sld>
-</file>
-
-<file path=ppt/slides/slide8.xml><?xml version="1.0" encoding="utf-8"?>
-<p:sld xmlns:a="http://schemas.openxmlformats.org/drawingml/2006/main" xmlns:r="http://schemas.openxmlformats.org/officeDocument/2006/relationships" xmlns:p="http://schemas.openxmlformats.org/presentationml/2006/main">
-  <p:cSld>
-    <p:spTree>
-      <p:nvGrpSpPr>
-        <p:cNvPr id="1" name=""/>
-        <p:cNvGrpSpPr/>
-        <p:nvPr/>
-      </p:nvGrpSpPr>
-      <p:grpSpPr>
-        <a:xfrm>
-          <a:off x="0" y="0"/>
-          <a:ext cx="0" cy="0"/>
-          <a:chOff x="0" y="0"/>
-          <a:chExt cx="0" cy="0"/>
-        </a:xfrm>
-      </p:grpSpPr>
-      <p:sp>
-        <p:nvSpPr>
-          <p:cNvPr id="2" name="Title 1">
-            <a:extLst>
-              <a:ext uri="{FF2B5EF4-FFF2-40B4-BE49-F238E27FC236}">
-                <a16:creationId xmlns:a16="http://schemas.microsoft.com/office/drawing/2014/main" id="{3DFDFE6E-0F70-4498-A727-114AF49CE2A5}"/>
-              </a:ext>
-            </a:extLst>
-          </p:cNvPr>
-          <p:cNvSpPr>
-            <a:spLocks noGrp="1"/>
-          </p:cNvSpPr>
-          <p:nvPr>
-            <p:ph type="ctrTitle"/>
-          </p:nvPr>
-        </p:nvSpPr>
-        <p:spPr>
-          <a:xfrm>
-            <a:off x="366318" y="427839"/>
-            <a:ext cx="10472257" cy="3236053"/>
-          </a:xfrm>
-        </p:spPr>
-        <p:txBody>
-          <a:bodyPr>
-            <a:normAutofit/>
-          </a:bodyPr>
-          <a:lstStyle/>
-          <a:p>
-            <a:br>
-              <a:rPr lang="en-US" dirty="0"/>
-            </a:br>
-            <a:br>
-              <a:rPr lang="en-US" dirty="0"/>
-            </a:br>
-            <a:endParaRPr lang="en-US" dirty="0"/>
-          </a:p>
-        </p:txBody>
-      </p:sp>
-      <p:pic>
-        <p:nvPicPr>
-          <p:cNvPr id="3" name="Picture 2">
-            <a:extLst>
-              <a:ext uri="{FF2B5EF4-FFF2-40B4-BE49-F238E27FC236}">
-                <a16:creationId xmlns:a16="http://schemas.microsoft.com/office/drawing/2014/main" id="{4BE886BF-2F73-464C-839B-3CE78CD054FF}"/>
-              </a:ext>
-            </a:extLst>
-          </p:cNvPr>
-          <p:cNvPicPr>
-            <a:picLocks noChangeAspect="1"/>
-          </p:cNvPicPr>
-          <p:nvPr/>
-        </p:nvPicPr>
-        <p:blipFill>
-          <a:blip r:embed="rId2"/>
-          <a:stretch>
-            <a:fillRect/>
-          </a:stretch>
-        </p:blipFill>
-        <p:spPr>
-          <a:xfrm>
-            <a:off x="3048355" y="-116889"/>
-            <a:ext cx="6334985" cy="1089456"/>
-          </a:xfrm>
-          <a:prstGeom prst="rect">
-            <a:avLst/>
-          </a:prstGeom>
-        </p:spPr>
-      </p:pic>
-      <p:sp>
-        <p:nvSpPr>
-          <p:cNvPr id="8" name="TextBox 7">
-            <a:extLst>
-              <a:ext uri="{FF2B5EF4-FFF2-40B4-BE49-F238E27FC236}">
-                <a16:creationId xmlns:a16="http://schemas.microsoft.com/office/drawing/2014/main" id="{53B09C95-0B4A-4BCD-88A9-77079655ADE2}"/>
-              </a:ext>
-            </a:extLst>
-          </p:cNvPr>
-          <p:cNvSpPr txBox="1"/>
-          <p:nvPr/>
-        </p:nvSpPr>
-        <p:spPr>
-          <a:xfrm>
-            <a:off x="239695" y="990846"/>
-            <a:ext cx="11952303" cy="6309420"/>
-          </a:xfrm>
-          <a:prstGeom prst="rect">
-            <a:avLst/>
-          </a:prstGeom>
-          <a:noFill/>
-        </p:spPr>
-        <p:txBody>
-          <a:bodyPr wrap="square" rtlCol="0">
-            <a:spAutoFit/>
-          </a:bodyPr>
-          <a:lstStyle/>
-          <a:p>
-            <a:r>
-              <a:rPr lang="en-US" sz="2400" dirty="0"/>
-              <a:t>¬(∃ </a:t>
-            </a:r>
-            <a:r>
-              <a:rPr lang="en-US" sz="2400" dirty="0" err="1"/>
-              <a:t>p,q</a:t>
-            </a:r>
-            <a:r>
-              <a:rPr lang="en-US" sz="2400" dirty="0"/>
-              <a:t> </a:t>
-            </a:r>
-            <a:r>
-              <a:rPr lang="el-GR" sz="2400" dirty="0"/>
-              <a:t>ϵ</a:t>
-            </a:r>
-            <a:r>
-              <a:rPr lang="en-US" sz="2400" dirty="0"/>
-              <a:t> ℤ   ∋  sqrt(3) = p/q) </a:t>
-            </a:r>
-          </a:p>
-          <a:p>
-            <a:endParaRPr lang="en-US" sz="500" dirty="0"/>
-          </a:p>
-          <a:p>
-            <a:r>
-              <a:rPr lang="en-US" sz="2400" dirty="0"/>
-              <a:t>Do we have to worry about q=0?</a:t>
-            </a:r>
-          </a:p>
-          <a:p>
-            <a:endParaRPr lang="en-US" sz="1100" dirty="0"/>
-          </a:p>
-          <a:p>
-            <a:r>
-              <a:rPr lang="en-US" sz="2400" dirty="0"/>
-              <a:t>Assume:  ∃ </a:t>
-            </a:r>
-            <a:r>
-              <a:rPr lang="en-US" sz="2400" dirty="0" err="1"/>
-              <a:t>p,q</a:t>
-            </a:r>
-            <a:r>
-              <a:rPr lang="en-US" sz="2400" dirty="0"/>
-              <a:t> </a:t>
-            </a:r>
-            <a:r>
-              <a:rPr lang="el-GR" sz="2400" dirty="0"/>
-              <a:t>ϵ</a:t>
-            </a:r>
-            <a:r>
-              <a:rPr lang="en-US" sz="2400" dirty="0"/>
-              <a:t> ℤ   ∋  sqrt(3) = p/q</a:t>
-            </a:r>
-          </a:p>
-          <a:p>
-            <a:endParaRPr lang="en-US" sz="700" dirty="0"/>
-          </a:p>
-          <a:p>
-            <a:endParaRPr lang="en-US" sz="800" dirty="0"/>
-          </a:p>
-          <a:p>
-            <a:r>
-              <a:rPr lang="en-US" sz="2400" dirty="0"/>
-              <a:t>	</a:t>
-            </a:r>
-            <a:r>
-              <a:rPr lang="en-US" sz="2400" u="sng" dirty="0"/>
-              <a:t>Case 1: q is even. </a:t>
-            </a:r>
-          </a:p>
-          <a:p>
-            <a:r>
-              <a:rPr lang="en-US" sz="2400" dirty="0"/>
-              <a:t>		</a:t>
-            </a:r>
-            <a:r>
-              <a:rPr lang="en-US" sz="2400" dirty="0">
-                <a:sym typeface="Wingdings" panose="05000000000000000000" pitchFamily="2" charset="2"/>
-              </a:rPr>
-              <a:t>=&gt; </a:t>
-            </a:r>
-            <a:r>
-              <a:rPr lang="en-US" sz="2400" dirty="0"/>
-              <a:t>p/q is an integer.</a:t>
-            </a:r>
-          </a:p>
-          <a:p>
-            <a:r>
-              <a:rPr lang="en-US" sz="2400" dirty="0"/>
-              <a:t>		</a:t>
-            </a:r>
-            <a:r>
-              <a:rPr lang="en-US" sz="2400" dirty="0">
-                <a:sym typeface="Wingdings" panose="05000000000000000000" pitchFamily="2" charset="2"/>
-              </a:rPr>
-              <a:t>=&gt; </a:t>
-            </a:r>
-            <a:r>
-              <a:rPr lang="en-US" sz="2400" dirty="0"/>
-              <a:t>sqrt(3) is an integer.</a:t>
-            </a:r>
-          </a:p>
-          <a:p>
-            <a:r>
-              <a:rPr lang="en-US" sz="2400" dirty="0"/>
-              <a:t>		=&gt; Prove that sqrt(3) is NOT an integer (exercise).</a:t>
-            </a:r>
-          </a:p>
-          <a:p>
-            <a:r>
-              <a:rPr lang="en-US" sz="2400" dirty="0"/>
-              <a:t> </a:t>
-            </a:r>
-          </a:p>
-          <a:p>
-            <a:r>
-              <a:rPr lang="en-US" sz="2400" dirty="0"/>
-              <a:t>	</a:t>
-            </a:r>
-            <a:r>
-              <a:rPr lang="en-US" sz="2400" u="sng" dirty="0"/>
-              <a:t>Case 2: q is odd.</a:t>
-            </a:r>
-          </a:p>
-          <a:p>
-            <a:r>
-              <a:rPr lang="en-US" sz="2400" dirty="0"/>
-              <a:t>		</a:t>
-            </a:r>
-            <a:r>
-              <a:rPr lang="en-US" sz="2400" u="sng" dirty="0"/>
-              <a:t>Case 2.1: p is even</a:t>
-            </a:r>
-          </a:p>
-          <a:p>
-            <a:r>
-              <a:rPr lang="en-US" sz="2400" dirty="0"/>
-              <a:t>			Not possible (exercise).</a:t>
-            </a:r>
-          </a:p>
-          <a:p>
-            <a:r>
-              <a:rPr lang="en-US" sz="2400" dirty="0"/>
-              <a:t>		</a:t>
-            </a:r>
-            <a:r>
-              <a:rPr lang="en-US" sz="2400" u="sng" dirty="0"/>
-              <a:t>Case 2.2: p is odd</a:t>
-            </a:r>
-          </a:p>
-          <a:p>
-            <a:r>
-              <a:rPr lang="en-US" sz="2400" dirty="0"/>
-              <a:t>			 ∃ n </a:t>
-            </a:r>
-            <a:r>
-              <a:rPr lang="el-GR" sz="2400" dirty="0"/>
-              <a:t>ϵ</a:t>
-            </a:r>
-            <a:r>
-              <a:rPr lang="en-US" sz="2400" dirty="0"/>
-              <a:t> ℤ  ∋ p = 2n+1</a:t>
-            </a:r>
-          </a:p>
-          <a:p>
-            <a:r>
-              <a:rPr lang="en-US" sz="2400" dirty="0"/>
-              <a:t>			 ∃ m </a:t>
-            </a:r>
-            <a:r>
-              <a:rPr lang="el-GR" sz="2400" dirty="0"/>
-              <a:t>ϵ</a:t>
-            </a:r>
-            <a:r>
-              <a:rPr lang="en-US" sz="2400" dirty="0"/>
-              <a:t> ℤ  ∋ q = 2m+1</a:t>
-            </a:r>
-          </a:p>
-          <a:p>
-            <a:endParaRPr lang="en-US" sz="2400" dirty="0"/>
-          </a:p>
-        </p:txBody>
-      </p:sp>
-    </p:spTree>
-    <p:extLst>
-      <p:ext uri="{BB962C8B-B14F-4D97-AF65-F5344CB8AC3E}">
-        <p14:creationId xmlns:p14="http://schemas.microsoft.com/office/powerpoint/2010/main" val="1173767071"/>
-      </p:ext>
-    </p:extLst>
-  </p:cSld>
-  <p:clrMapOvr>
-    <a:masterClrMapping/>
-  </p:clrMapOvr>
-  <p:timing>
-    <p:tnLst>
-      <p:par>
-        <p:cTn id="1" dur="indefinite" restart="never" nodeType="tmRoot">
-          <p:childTnLst>
-            <p:seq concurrent="1" nextAc="seek">
-              <p:cTn id="2" dur="indefinite" nodeType="mainSeq">
-                <p:childTnLst>
-                  <p:par>
-                    <p:cTn id="3" fill="hold">
-                      <p:stCondLst>
-                        <p:cond delay="indefinite"/>
-                      </p:stCondLst>
-                      <p:childTnLst>
-                        <p:par>
-                          <p:cTn id="4" fill="hold">
-                            <p:stCondLst>
-                              <p:cond delay="0"/>
-                            </p:stCondLst>
-                            <p:childTnLst>
-                              <p:par>
-                                <p:cTn id="5" presetID="1" presetClass="entr" presetSubtype="0" fill="hold" nodeType="clickEffect">
-                                  <p:stCondLst>
-                                    <p:cond delay="0"/>
-                                  </p:stCondLst>
-                                  <p:childTnLst>
-                                    <p:set>
-                                      <p:cBhvr>
-                                        <p:cTn id="6" dur="1" fill="hold">
-                                          <p:stCondLst>
-                                            <p:cond delay="0"/>
-                                          </p:stCondLst>
-                                        </p:cTn>
-                                        <p:tgtEl>
-                                          <p:spTgt spid="8">
-                                            <p:txEl>
-                                              <p:pRg st="0" end="0"/>
-                                            </p:txEl>
-                                          </p:spTgt>
-                                        </p:tgtEl>
-                                        <p:attrNameLst>
-                                          <p:attrName>style.visibility</p:attrName>
-                                        </p:attrNameLst>
-                                      </p:cBhvr>
-                                      <p:to>
-                                        <p:strVal val="visible"/>
-                                      </p:to>
-                                    </p:set>
-                                  </p:childTnLst>
-                                </p:cTn>
-                              </p:par>
-                            </p:childTnLst>
-                          </p:cTn>
-                        </p:par>
-                      </p:childTnLst>
-                    </p:cTn>
-                  </p:par>
-                  <p:par>
-                    <p:cTn id="7" fill="hold">
-                      <p:stCondLst>
-                        <p:cond delay="indefinite"/>
-                      </p:stCondLst>
-                      <p:childTnLst>
-                        <p:par>
-                          <p:cTn id="8" fill="hold">
-                            <p:stCondLst>
-                              <p:cond delay="0"/>
-                            </p:stCondLst>
-                            <p:childTnLst>
-                              <p:par>
-                                <p:cTn id="9" presetID="1" presetClass="entr" presetSubtype="0" fill="hold" nodeType="clickEffect">
-                                  <p:stCondLst>
-                                    <p:cond delay="0"/>
-                                  </p:stCondLst>
-                                  <p:childTnLst>
-                                    <p:set>
-                                      <p:cBhvr>
-                                        <p:cTn id="10" dur="1" fill="hold">
-                                          <p:stCondLst>
-                                            <p:cond delay="0"/>
-                                          </p:stCondLst>
-                                        </p:cTn>
-                                        <p:tgtEl>
-                                          <p:spTgt spid="8">
-                                            <p:txEl>
-                                              <p:pRg st="2" end="2"/>
-                                            </p:txEl>
-                                          </p:spTgt>
-                                        </p:tgtEl>
-                                        <p:attrNameLst>
-                                          <p:attrName>style.visibility</p:attrName>
-                                        </p:attrNameLst>
-                                      </p:cBhvr>
-                                      <p:to>
-                                        <p:strVal val="visible"/>
-                                      </p:to>
-                                    </p:set>
-                                  </p:childTnLst>
-                                </p:cTn>
-                              </p:par>
-                            </p:childTnLst>
-                          </p:cTn>
-                        </p:par>
-                      </p:childTnLst>
-                    </p:cTn>
-                  </p:par>
-                  <p:par>
-                    <p:cTn id="11" fill="hold">
-                      <p:stCondLst>
-                        <p:cond delay="indefinite"/>
-                      </p:stCondLst>
-                      <p:childTnLst>
-                        <p:par>
-                          <p:cTn id="12" fill="hold">
-                            <p:stCondLst>
-                              <p:cond delay="0"/>
-                            </p:stCondLst>
-                            <p:childTnLst>
-                              <p:par>
-                                <p:cTn id="13" presetID="1" presetClass="entr" presetSubtype="0" fill="hold" nodeType="clickEffect">
-                                  <p:stCondLst>
-                                    <p:cond delay="0"/>
-                                  </p:stCondLst>
-                                  <p:childTnLst>
-                                    <p:set>
-                                      <p:cBhvr>
-                                        <p:cTn id="14" dur="1" fill="hold">
-                                          <p:stCondLst>
-                                            <p:cond delay="0"/>
-                                          </p:stCondLst>
-                                        </p:cTn>
-                                        <p:tgtEl>
-                                          <p:spTgt spid="8">
-                                            <p:txEl>
-                                              <p:pRg st="4" end="4"/>
-                                            </p:txEl>
-                                          </p:spTgt>
-                                        </p:tgtEl>
-                                        <p:attrNameLst>
-                                          <p:attrName>style.visibility</p:attrName>
-                                        </p:attrNameLst>
-                                      </p:cBhvr>
-                                      <p:to>
-                                        <p:strVal val="visible"/>
-                                      </p:to>
-                                    </p:set>
-                                  </p:childTnLst>
-                                </p:cTn>
-                              </p:par>
-                            </p:childTnLst>
-                          </p:cTn>
-                        </p:par>
-                      </p:childTnLst>
-                    </p:cTn>
-                  </p:par>
-                  <p:par>
-                    <p:cTn id="15" fill="hold">
-                      <p:stCondLst>
-                        <p:cond delay="indefinite"/>
-                      </p:stCondLst>
-                      <p:childTnLst>
-                        <p:par>
-                          <p:cTn id="16" fill="hold">
-                            <p:stCondLst>
-                              <p:cond delay="0"/>
-                            </p:stCondLst>
-                            <p:childTnLst>
-                              <p:par>
-                                <p:cTn id="17" presetID="1" presetClass="entr" presetSubtype="0" fill="hold" nodeType="clickEffect">
-                                  <p:stCondLst>
-                                    <p:cond delay="0"/>
-                                  </p:stCondLst>
-                                  <p:childTnLst>
-                                    <p:set>
-                                      <p:cBhvr>
-                                        <p:cTn id="18" dur="1" fill="hold">
-                                          <p:stCondLst>
-                                            <p:cond delay="0"/>
-                                          </p:stCondLst>
-                                        </p:cTn>
-                                        <p:tgtEl>
-                                          <p:spTgt spid="8">
-                                            <p:txEl>
-                                              <p:pRg st="7" end="7"/>
-                                            </p:txEl>
-                                          </p:spTgt>
-                                        </p:tgtEl>
-                                        <p:attrNameLst>
-                                          <p:attrName>style.visibility</p:attrName>
-                                        </p:attrNameLst>
-                                      </p:cBhvr>
-                                      <p:to>
-                                        <p:strVal val="visible"/>
-                                      </p:to>
-                                    </p:set>
-                                  </p:childTnLst>
-                                </p:cTn>
-                              </p:par>
-                            </p:childTnLst>
-                          </p:cTn>
-                        </p:par>
-                      </p:childTnLst>
-                    </p:cTn>
-                  </p:par>
-                  <p:par>
-                    <p:cTn id="19" fill="hold">
-                      <p:stCondLst>
-                        <p:cond delay="indefinite"/>
-                      </p:stCondLst>
-                      <p:childTnLst>
-                        <p:par>
-                          <p:cTn id="20" fill="hold">
-                            <p:stCondLst>
-                              <p:cond delay="0"/>
-                            </p:stCondLst>
-                            <p:childTnLst>
-                              <p:par>
-                                <p:cTn id="21" presetID="1" presetClass="entr" presetSubtype="0" fill="hold" nodeType="clickEffect">
-                                  <p:stCondLst>
-                                    <p:cond delay="0"/>
-                                  </p:stCondLst>
-                                  <p:childTnLst>
-                                    <p:set>
-                                      <p:cBhvr>
-                                        <p:cTn id="22" dur="1" fill="hold">
-                                          <p:stCondLst>
-                                            <p:cond delay="0"/>
-                                          </p:stCondLst>
-                                        </p:cTn>
-                                        <p:tgtEl>
-                                          <p:spTgt spid="8">
-                                            <p:txEl>
-                                              <p:pRg st="8" end="8"/>
-                                            </p:txEl>
-                                          </p:spTgt>
-                                        </p:tgtEl>
-                                        <p:attrNameLst>
-                                          <p:attrName>style.visibility</p:attrName>
-                                        </p:attrNameLst>
-                                      </p:cBhvr>
-                                      <p:to>
-                                        <p:strVal val="visible"/>
-                                      </p:to>
-                                    </p:set>
-                                  </p:childTnLst>
-                                </p:cTn>
-                              </p:par>
-                            </p:childTnLst>
-                          </p:cTn>
-                        </p:par>
-                      </p:childTnLst>
-                    </p:cTn>
-                  </p:par>
-                  <p:par>
-                    <p:cTn id="23" fill="hold">
-                      <p:stCondLst>
-                        <p:cond delay="indefinite"/>
-                      </p:stCondLst>
-                      <p:childTnLst>
-                        <p:par>
-                          <p:cTn id="24" fill="hold">
-                            <p:stCondLst>
-                              <p:cond delay="0"/>
-                            </p:stCondLst>
-                            <p:childTnLst>
-                              <p:par>
-                                <p:cTn id="25" presetID="1" presetClass="entr" presetSubtype="0" fill="hold" nodeType="clickEffect">
-                                  <p:stCondLst>
-                                    <p:cond delay="0"/>
-                                  </p:stCondLst>
-                                  <p:childTnLst>
-                                    <p:set>
-                                      <p:cBhvr>
-                                        <p:cTn id="26" dur="1" fill="hold">
-                                          <p:stCondLst>
-                                            <p:cond delay="0"/>
-                                          </p:stCondLst>
-                                        </p:cTn>
-                                        <p:tgtEl>
-                                          <p:spTgt spid="8">
-                                            <p:txEl>
-                                              <p:pRg st="9" end="9"/>
-                                            </p:txEl>
-                                          </p:spTgt>
-                                        </p:tgtEl>
-                                        <p:attrNameLst>
-                                          <p:attrName>style.visibility</p:attrName>
-                                        </p:attrNameLst>
-                                      </p:cBhvr>
-                                      <p:to>
-                                        <p:strVal val="visible"/>
-                                      </p:to>
-                                    </p:set>
-                                  </p:childTnLst>
-                                </p:cTn>
-                              </p:par>
-                            </p:childTnLst>
-                          </p:cTn>
-                        </p:par>
-                      </p:childTnLst>
-                    </p:cTn>
-                  </p:par>
-                  <p:par>
-                    <p:cTn id="27" fill="hold">
-                      <p:stCondLst>
-                        <p:cond delay="indefinite"/>
-                      </p:stCondLst>
-                      <p:childTnLst>
-                        <p:par>
-                          <p:cTn id="28" fill="hold">
-                            <p:stCondLst>
-                              <p:cond delay="0"/>
-                            </p:stCondLst>
-                            <p:childTnLst>
-                              <p:par>
-                                <p:cTn id="29" presetID="1" presetClass="entr" presetSubtype="0" fill="hold" nodeType="clickEffect">
-                                  <p:stCondLst>
-                                    <p:cond delay="0"/>
-                                  </p:stCondLst>
-                                  <p:childTnLst>
-                                    <p:set>
-                                      <p:cBhvr>
-                                        <p:cTn id="30" dur="1" fill="hold">
-                                          <p:stCondLst>
-                                            <p:cond delay="0"/>
-                                          </p:stCondLst>
-                                        </p:cTn>
-                                        <p:tgtEl>
-                                          <p:spTgt spid="8">
                                             <p:txEl>
                                               <p:pRg st="10" end="10"/>
                                             </p:txEl>
@@ -7320,32 +6488,32 @@
                     </p:cTn>
                   </p:par>
                   <p:par>
-                    <p:cTn id="31" fill="hold">
+                    <p:cTn id="33" fill="hold">
                       <p:stCondLst>
                         <p:cond delay="indefinite"/>
                       </p:stCondLst>
                       <p:childTnLst>
                         <p:par>
-                          <p:cTn id="32" fill="hold">
+                          <p:cTn id="34" fill="hold">
                             <p:stCondLst>
                               <p:cond delay="0"/>
                             </p:stCondLst>
                             <p:childTnLst>
                               <p:par>
-                                <p:cTn id="33" presetID="1" presetClass="entr" presetSubtype="0" fill="hold" nodeType="clickEffect">
+                                <p:cTn id="35" presetID="1" presetClass="entr" presetSubtype="0" fill="hold" nodeType="clickEffect">
                                   <p:stCondLst>
                                     <p:cond delay="0"/>
                                   </p:stCondLst>
                                   <p:childTnLst>
                                     <p:set>
                                       <p:cBhvr>
-                                        <p:cTn id="34" dur="1" fill="hold">
+                                        <p:cTn id="36" dur="1" fill="hold">
                                           <p:stCondLst>
                                             <p:cond delay="0"/>
                                           </p:stCondLst>
                                         </p:cTn>
                                         <p:tgtEl>
-                                          <p:spTgt spid="8">
+                                          <p:spTgt spid="4">
                                             <p:txEl>
                                               <p:pRg st="12" end="12"/>
                                             </p:txEl>
@@ -7369,1151 +6537,34 @@
                     </p:cTn>
                   </p:par>
                   <p:par>
-                    <p:cTn id="35" fill="hold">
+                    <p:cTn id="37" fill="hold">
                       <p:stCondLst>
                         <p:cond delay="indefinite"/>
                       </p:stCondLst>
                       <p:childTnLst>
                         <p:par>
-                          <p:cTn id="36" fill="hold">
+                          <p:cTn id="38" fill="hold">
                             <p:stCondLst>
                               <p:cond delay="0"/>
                             </p:stCondLst>
                             <p:childTnLst>
                               <p:par>
-                                <p:cTn id="37" presetID="1" presetClass="entr" presetSubtype="0" fill="hold" nodeType="clickEffect">
+                                <p:cTn id="39" presetID="1" presetClass="entr" presetSubtype="0" fill="hold" nodeType="clickEffect">
                                   <p:stCondLst>
                                     <p:cond delay="0"/>
                                   </p:stCondLst>
                                   <p:childTnLst>
                                     <p:set>
                                       <p:cBhvr>
-                                        <p:cTn id="38" dur="1" fill="hold">
+                                        <p:cTn id="40" dur="1" fill="hold">
                                           <p:stCondLst>
                                             <p:cond delay="0"/>
                                           </p:stCondLst>
                                         </p:cTn>
                                         <p:tgtEl>
-                                          <p:spTgt spid="8">
-                                            <p:txEl>
-                                              <p:pRg st="13" end="13"/>
-                                            </p:txEl>
-                                          </p:spTgt>
-                                        </p:tgtEl>
-                                        <p:attrNameLst>
-                                          <p:attrName>style.visibility</p:attrName>
-                                        </p:attrNameLst>
-                                      </p:cBhvr>
-                                      <p:to>
-                                        <p:strVal val="visible"/>
-                                      </p:to>
-                                    </p:set>
-                                  </p:childTnLst>
-                                </p:cTn>
-                              </p:par>
-                            </p:childTnLst>
-                          </p:cTn>
-                        </p:par>
-                      </p:childTnLst>
-                    </p:cTn>
-                  </p:par>
-                  <p:par>
-                    <p:cTn id="39" fill="hold">
-                      <p:stCondLst>
-                        <p:cond delay="indefinite"/>
-                      </p:stCondLst>
-                      <p:childTnLst>
-                        <p:par>
-                          <p:cTn id="40" fill="hold">
-                            <p:stCondLst>
-                              <p:cond delay="0"/>
-                            </p:stCondLst>
-                            <p:childTnLst>
-                              <p:par>
-                                <p:cTn id="41" presetID="1" presetClass="entr" presetSubtype="0" fill="hold" nodeType="clickEffect">
-                                  <p:stCondLst>
-                                    <p:cond delay="0"/>
-                                  </p:stCondLst>
-                                  <p:childTnLst>
-                                    <p:set>
-                                      <p:cBhvr>
-                                        <p:cTn id="42" dur="1" fill="hold">
-                                          <p:stCondLst>
-                                            <p:cond delay="0"/>
-                                          </p:stCondLst>
-                                        </p:cTn>
-                                        <p:tgtEl>
-                                          <p:spTgt spid="8">
+                                          <p:spTgt spid="4">
                                             <p:txEl>
                                               <p:pRg st="14" end="14"/>
-                                            </p:txEl>
-                                          </p:spTgt>
-                                        </p:tgtEl>
-                                        <p:attrNameLst>
-                                          <p:attrName>style.visibility</p:attrName>
-                                        </p:attrNameLst>
-                                      </p:cBhvr>
-                                      <p:to>
-                                        <p:strVal val="visible"/>
-                                      </p:to>
-                                    </p:set>
-                                  </p:childTnLst>
-                                </p:cTn>
-                              </p:par>
-                            </p:childTnLst>
-                          </p:cTn>
-                        </p:par>
-                      </p:childTnLst>
-                    </p:cTn>
-                  </p:par>
-                  <p:par>
-                    <p:cTn id="43" fill="hold">
-                      <p:stCondLst>
-                        <p:cond delay="indefinite"/>
-                      </p:stCondLst>
-                      <p:childTnLst>
-                        <p:par>
-                          <p:cTn id="44" fill="hold">
-                            <p:stCondLst>
-                              <p:cond delay="0"/>
-                            </p:stCondLst>
-                            <p:childTnLst>
-                              <p:par>
-                                <p:cTn id="45" presetID="1" presetClass="entr" presetSubtype="0" fill="hold" nodeType="clickEffect">
-                                  <p:stCondLst>
-                                    <p:cond delay="0"/>
-                                  </p:stCondLst>
-                                  <p:childTnLst>
-                                    <p:set>
-                                      <p:cBhvr>
-                                        <p:cTn id="46" dur="1" fill="hold">
-                                          <p:stCondLst>
-                                            <p:cond delay="0"/>
-                                          </p:stCondLst>
-                                        </p:cTn>
-                                        <p:tgtEl>
-                                          <p:spTgt spid="8">
-                                            <p:txEl>
-                                              <p:pRg st="15" end="15"/>
-                                            </p:txEl>
-                                          </p:spTgt>
-                                        </p:tgtEl>
-                                        <p:attrNameLst>
-                                          <p:attrName>style.visibility</p:attrName>
-                                        </p:attrNameLst>
-                                      </p:cBhvr>
-                                      <p:to>
-                                        <p:strVal val="visible"/>
-                                      </p:to>
-                                    </p:set>
-                                  </p:childTnLst>
-                                </p:cTn>
-                              </p:par>
-                            </p:childTnLst>
-                          </p:cTn>
-                        </p:par>
-                      </p:childTnLst>
-                    </p:cTn>
-                  </p:par>
-                  <p:par>
-                    <p:cTn id="47" fill="hold">
-                      <p:stCondLst>
-                        <p:cond delay="indefinite"/>
-                      </p:stCondLst>
-                      <p:childTnLst>
-                        <p:par>
-                          <p:cTn id="48" fill="hold">
-                            <p:stCondLst>
-                              <p:cond delay="0"/>
-                            </p:stCondLst>
-                            <p:childTnLst>
-                              <p:par>
-                                <p:cTn id="49" presetID="1" presetClass="entr" presetSubtype="0" fill="hold" nodeType="clickEffect">
-                                  <p:stCondLst>
-                                    <p:cond delay="0"/>
-                                  </p:stCondLst>
-                                  <p:childTnLst>
-                                    <p:set>
-                                      <p:cBhvr>
-                                        <p:cTn id="50" dur="1" fill="hold">
-                                          <p:stCondLst>
-                                            <p:cond delay="0"/>
-                                          </p:stCondLst>
-                                        </p:cTn>
-                                        <p:tgtEl>
-                                          <p:spTgt spid="8">
-                                            <p:txEl>
-                                              <p:pRg st="16" end="16"/>
-                                            </p:txEl>
-                                          </p:spTgt>
-                                        </p:tgtEl>
-                                        <p:attrNameLst>
-                                          <p:attrName>style.visibility</p:attrName>
-                                        </p:attrNameLst>
-                                      </p:cBhvr>
-                                      <p:to>
-                                        <p:strVal val="visible"/>
-                                      </p:to>
-                                    </p:set>
-                                  </p:childTnLst>
-                                </p:cTn>
-                              </p:par>
-                            </p:childTnLst>
-                          </p:cTn>
-                        </p:par>
-                      </p:childTnLst>
-                    </p:cTn>
-                  </p:par>
-                  <p:par>
-                    <p:cTn id="51" fill="hold">
-                      <p:stCondLst>
-                        <p:cond delay="indefinite"/>
-                      </p:stCondLst>
-                      <p:childTnLst>
-                        <p:par>
-                          <p:cTn id="52" fill="hold">
-                            <p:stCondLst>
-                              <p:cond delay="0"/>
-                            </p:stCondLst>
-                            <p:childTnLst>
-                              <p:par>
-                                <p:cTn id="53" presetID="1" presetClass="entr" presetSubtype="0" fill="hold" nodeType="clickEffect">
-                                  <p:stCondLst>
-                                    <p:cond delay="0"/>
-                                  </p:stCondLst>
-                                  <p:childTnLst>
-                                    <p:set>
-                                      <p:cBhvr>
-                                        <p:cTn id="54" dur="1" fill="hold">
-                                          <p:stCondLst>
-                                            <p:cond delay="0"/>
-                                          </p:stCondLst>
-                                        </p:cTn>
-                                        <p:tgtEl>
-                                          <p:spTgt spid="8">
-                                            <p:txEl>
-                                              <p:pRg st="17" end="17"/>
-                                            </p:txEl>
-                                          </p:spTgt>
-                                        </p:tgtEl>
-                                        <p:attrNameLst>
-                                          <p:attrName>style.visibility</p:attrName>
-                                        </p:attrNameLst>
-                                      </p:cBhvr>
-                                      <p:to>
-                                        <p:strVal val="visible"/>
-                                      </p:to>
-                                    </p:set>
-                                  </p:childTnLst>
-                                </p:cTn>
-                              </p:par>
-                            </p:childTnLst>
-                          </p:cTn>
-                        </p:par>
-                      </p:childTnLst>
-                    </p:cTn>
-                  </p:par>
-                </p:childTnLst>
-              </p:cTn>
-              <p:prevCondLst>
-                <p:cond evt="onPrev" delay="0">
-                  <p:tgtEl>
-                    <p:sldTgt/>
-                  </p:tgtEl>
-                </p:cond>
-              </p:prevCondLst>
-              <p:nextCondLst>
-                <p:cond evt="onNext" delay="0">
-                  <p:tgtEl>
-                    <p:sldTgt/>
-                  </p:tgtEl>
-                </p:cond>
-              </p:nextCondLst>
-            </p:seq>
-          </p:childTnLst>
-        </p:cTn>
-      </p:par>
-    </p:tnLst>
-  </p:timing>
-</p:sld>
-</file>
-
-<file path=ppt/slides/slide9.xml><?xml version="1.0" encoding="utf-8"?>
-<p:sld xmlns:a="http://schemas.openxmlformats.org/drawingml/2006/main" xmlns:r="http://schemas.openxmlformats.org/officeDocument/2006/relationships" xmlns:p="http://schemas.openxmlformats.org/presentationml/2006/main">
-  <p:cSld>
-    <p:spTree>
-      <p:nvGrpSpPr>
-        <p:cNvPr id="1" name=""/>
-        <p:cNvGrpSpPr/>
-        <p:nvPr/>
-      </p:nvGrpSpPr>
-      <p:grpSpPr>
-        <a:xfrm>
-          <a:off x="0" y="0"/>
-          <a:ext cx="0" cy="0"/>
-          <a:chOff x="0" y="0"/>
-          <a:chExt cx="0" cy="0"/>
-        </a:xfrm>
-      </p:grpSpPr>
-      <p:sp>
-        <p:nvSpPr>
-          <p:cNvPr id="2" name="Title 1">
-            <a:extLst>
-              <a:ext uri="{FF2B5EF4-FFF2-40B4-BE49-F238E27FC236}">
-                <a16:creationId xmlns:a16="http://schemas.microsoft.com/office/drawing/2014/main" id="{3DFDFE6E-0F70-4498-A727-114AF49CE2A5}"/>
-              </a:ext>
-            </a:extLst>
-          </p:cNvPr>
-          <p:cNvSpPr>
-            <a:spLocks noGrp="1"/>
-          </p:cNvSpPr>
-          <p:nvPr>
-            <p:ph type="ctrTitle"/>
-          </p:nvPr>
-        </p:nvSpPr>
-        <p:spPr>
-          <a:xfrm>
-            <a:off x="366318" y="427839"/>
-            <a:ext cx="10472257" cy="3236053"/>
-          </a:xfrm>
-        </p:spPr>
-        <p:txBody>
-          <a:bodyPr>
-            <a:normAutofit/>
-          </a:bodyPr>
-          <a:lstStyle/>
-          <a:p>
-            <a:br>
-              <a:rPr lang="en-US" dirty="0"/>
-            </a:br>
-            <a:br>
-              <a:rPr lang="en-US" dirty="0"/>
-            </a:br>
-            <a:endParaRPr lang="en-US" dirty="0"/>
-          </a:p>
-        </p:txBody>
-      </p:sp>
-      <p:sp>
-        <p:nvSpPr>
-          <p:cNvPr id="8" name="TextBox 7">
-            <a:extLst>
-              <a:ext uri="{FF2B5EF4-FFF2-40B4-BE49-F238E27FC236}">
-                <a16:creationId xmlns:a16="http://schemas.microsoft.com/office/drawing/2014/main" id="{53B09C95-0B4A-4BCD-88A9-77079655ADE2}"/>
-              </a:ext>
-            </a:extLst>
-          </p:cNvPr>
-          <p:cNvSpPr txBox="1"/>
-          <p:nvPr/>
-        </p:nvSpPr>
-        <p:spPr>
-          <a:xfrm>
-            <a:off x="239697" y="159573"/>
-            <a:ext cx="11952303" cy="6855723"/>
-          </a:xfrm>
-          <a:prstGeom prst="rect">
-            <a:avLst/>
-          </a:prstGeom>
-          <a:noFill/>
-        </p:spPr>
-        <p:txBody>
-          <a:bodyPr wrap="square" rtlCol="0">
-            <a:spAutoFit/>
-          </a:bodyPr>
-          <a:lstStyle/>
-          <a:p>
-            <a:r>
-              <a:rPr lang="en-US" sz="2400" dirty="0"/>
-              <a:t>Assumption: ∃ </a:t>
-            </a:r>
-            <a:r>
-              <a:rPr lang="en-US" sz="2400" dirty="0" err="1"/>
-              <a:t>p,q</a:t>
-            </a:r>
-            <a:r>
-              <a:rPr lang="en-US" sz="2400" dirty="0"/>
-              <a:t> </a:t>
-            </a:r>
-            <a:r>
-              <a:rPr lang="el-GR" sz="2400" dirty="0"/>
-              <a:t>ϵ</a:t>
-            </a:r>
-            <a:r>
-              <a:rPr lang="en-US" sz="2400" dirty="0"/>
-              <a:t> ℤ   ∋  sqrt(3) = p/q)</a:t>
-            </a:r>
-          </a:p>
-          <a:p>
-            <a:endParaRPr lang="en-US" sz="1000" u="sng" dirty="0"/>
-          </a:p>
-          <a:p>
-            <a:r>
-              <a:rPr lang="en-US" sz="2400" dirty="0"/>
-              <a:t>	</a:t>
-            </a:r>
-            <a:r>
-              <a:rPr lang="en-US" sz="2400" u="sng" dirty="0"/>
-              <a:t>Case 2.2: p is odd</a:t>
-            </a:r>
-          </a:p>
-          <a:p>
-            <a:r>
-              <a:rPr lang="en-US" sz="2400" dirty="0"/>
-              <a:t>		 ∃ n </a:t>
-            </a:r>
-            <a:r>
-              <a:rPr lang="el-GR" sz="2400" dirty="0"/>
-              <a:t>ϵ</a:t>
-            </a:r>
-            <a:r>
-              <a:rPr lang="en-US" sz="2400" dirty="0"/>
-              <a:t> ℤ  ∋ p = 2n+1</a:t>
-            </a:r>
-          </a:p>
-          <a:p>
-            <a:r>
-              <a:rPr lang="en-US" sz="2400" dirty="0"/>
-              <a:t>		 ∃ m </a:t>
-            </a:r>
-            <a:r>
-              <a:rPr lang="el-GR" sz="2400" dirty="0"/>
-              <a:t>ϵ</a:t>
-            </a:r>
-            <a:r>
-              <a:rPr lang="en-US" sz="2400" dirty="0"/>
-              <a:t> ℤ  ∋ q = 2m+1</a:t>
-            </a:r>
-          </a:p>
-          <a:p>
-            <a:r>
-              <a:rPr lang="en-US" sz="1000" dirty="0"/>
-              <a:t>		</a:t>
-            </a:r>
-          </a:p>
-          <a:p>
-            <a:r>
-              <a:rPr lang="en-US" sz="2400" dirty="0"/>
-              <a:t>		 q sqrt(3)                     =  p</a:t>
-            </a:r>
-          </a:p>
-          <a:p>
-            <a:r>
-              <a:rPr lang="en-US" sz="2400" dirty="0"/>
-              <a:t>		 (2m + 1) sqrt(3)        =  (2n + 1)</a:t>
-            </a:r>
-          </a:p>
-          <a:p>
-            <a:r>
-              <a:rPr lang="en-US" sz="2400" dirty="0"/>
-              <a:t>		 (2m + 1)^2  x 3          =  (2n + 1)^2</a:t>
-            </a:r>
-          </a:p>
-          <a:p>
-            <a:r>
-              <a:rPr lang="en-US" sz="2400" dirty="0"/>
-              <a:t>		 (4m^2 + 4m + 1) x 3 = 4n^2 + 4n + 1</a:t>
-            </a:r>
-          </a:p>
-          <a:p>
-            <a:r>
-              <a:rPr lang="en-US" sz="2400" dirty="0"/>
-              <a:t>		 12m^2 + 12m + 3    </a:t>
-            </a:r>
-            <a:r>
-              <a:rPr lang="en-US" sz="1200" dirty="0"/>
-              <a:t> </a:t>
-            </a:r>
-            <a:r>
-              <a:rPr lang="en-US" sz="2400" dirty="0"/>
-              <a:t> = 4n^2 + 4n + 1</a:t>
-            </a:r>
-          </a:p>
-          <a:p>
-            <a:r>
-              <a:rPr lang="en-US" sz="2400" dirty="0"/>
-              <a:t>		 12m^2 + 12m + 2      = 2n^2 + 2n </a:t>
-            </a:r>
-          </a:p>
-          <a:p>
-            <a:r>
-              <a:rPr lang="en-US" sz="2400" dirty="0"/>
-              <a:t>		 12(m^2 + m) + 1        = 2n(n+1)</a:t>
-            </a:r>
-          </a:p>
-          <a:p>
-            <a:r>
-              <a:rPr lang="en-US" sz="1050" dirty="0"/>
-              <a:t> 	</a:t>
-            </a:r>
-          </a:p>
-          <a:p>
-            <a:r>
-              <a:rPr lang="en-US" sz="2400" dirty="0"/>
-              <a:t>		 Let n(n+1) = A,  m^2 + m = B.</a:t>
-            </a:r>
-          </a:p>
-          <a:p>
-            <a:r>
-              <a:rPr lang="en-US" sz="2400" dirty="0"/>
-              <a:t>	   	 A </a:t>
-            </a:r>
-            <a:r>
-              <a:rPr lang="el-GR" sz="2400" dirty="0"/>
-              <a:t>ϵ</a:t>
-            </a:r>
-            <a:r>
-              <a:rPr lang="en-US" sz="2400" dirty="0"/>
-              <a:t> ℤ , B </a:t>
-            </a:r>
-            <a:r>
-              <a:rPr lang="el-GR" sz="2400" dirty="0"/>
-              <a:t>ϵ</a:t>
-            </a:r>
-            <a:r>
-              <a:rPr lang="en-US" sz="2400" dirty="0"/>
-              <a:t> ℤ 	</a:t>
-            </a:r>
-          </a:p>
-          <a:p>
-            <a:endParaRPr lang="en-US" sz="1100" dirty="0"/>
-          </a:p>
-          <a:p>
-            <a:r>
-              <a:rPr lang="en-US" sz="2400" dirty="0"/>
-              <a:t>		 12A + 1                        = 2B		</a:t>
-            </a:r>
-          </a:p>
-          <a:p>
-            <a:r>
-              <a:rPr lang="en-US" sz="2400" dirty="0"/>
-              <a:t>		 12A + 1 is odd.               2B is even.     </a:t>
-            </a:r>
-            <a:r>
-              <a:rPr lang="en-US" sz="2400" dirty="0">
-                <a:sym typeface="Wingdings" panose="05000000000000000000" pitchFamily="2" charset="2"/>
-              </a:rPr>
-              <a:t>   Contradiction! </a:t>
-            </a:r>
-          </a:p>
-          <a:p>
-            <a:r>
-              <a:rPr lang="en-US" sz="2400" dirty="0"/>
-              <a:t>∴</a:t>
-            </a:r>
-            <a:r>
-              <a:rPr lang="en-US" sz="2400" dirty="0">
-                <a:sym typeface="Wingdings" panose="05000000000000000000" pitchFamily="2" charset="2"/>
-              </a:rPr>
-              <a:t>  </a:t>
-            </a:r>
-            <a:r>
-              <a:rPr lang="en-US" sz="2400" dirty="0"/>
-              <a:t>¬(∃ </a:t>
-            </a:r>
-            <a:r>
-              <a:rPr lang="en-US" sz="2400" dirty="0" err="1"/>
-              <a:t>p,q</a:t>
-            </a:r>
-            <a:r>
-              <a:rPr lang="en-US" sz="2400" dirty="0"/>
-              <a:t> </a:t>
-            </a:r>
-            <a:r>
-              <a:rPr lang="el-GR" sz="2400" dirty="0"/>
-              <a:t>ϵ</a:t>
-            </a:r>
-            <a:r>
-              <a:rPr lang="en-US" sz="2400" dirty="0"/>
-              <a:t> ℤ   ∋  sqrt(3) = p/q)</a:t>
-            </a:r>
-          </a:p>
-        </p:txBody>
-      </p:sp>
-    </p:spTree>
-    <p:extLst>
-      <p:ext uri="{BB962C8B-B14F-4D97-AF65-F5344CB8AC3E}">
-        <p14:creationId xmlns:p14="http://schemas.microsoft.com/office/powerpoint/2010/main" val="1630327796"/>
-      </p:ext>
-    </p:extLst>
-  </p:cSld>
-  <p:clrMapOvr>
-    <a:masterClrMapping/>
-  </p:clrMapOvr>
-  <p:timing>
-    <p:tnLst>
-      <p:par>
-        <p:cTn id="1" dur="indefinite" restart="never" nodeType="tmRoot">
-          <p:childTnLst>
-            <p:seq concurrent="1" nextAc="seek">
-              <p:cTn id="2" dur="indefinite" nodeType="mainSeq">
-                <p:childTnLst>
-                  <p:par>
-                    <p:cTn id="3" fill="hold">
-                      <p:stCondLst>
-                        <p:cond delay="indefinite"/>
-                      </p:stCondLst>
-                      <p:childTnLst>
-                        <p:par>
-                          <p:cTn id="4" fill="hold">
-                            <p:stCondLst>
-                              <p:cond delay="0"/>
-                            </p:stCondLst>
-                            <p:childTnLst>
-                              <p:par>
-                                <p:cTn id="5" presetID="1" presetClass="entr" presetSubtype="0" fill="hold" nodeType="clickEffect">
-                                  <p:stCondLst>
-                                    <p:cond delay="0"/>
-                                  </p:stCondLst>
-                                  <p:childTnLst>
-                                    <p:set>
-                                      <p:cBhvr>
-                                        <p:cTn id="6" dur="1" fill="hold">
-                                          <p:stCondLst>
-                                            <p:cond delay="0"/>
-                                          </p:stCondLst>
-                                        </p:cTn>
-                                        <p:tgtEl>
-                                          <p:spTgt spid="8">
-                                            <p:txEl>
-                                              <p:pRg st="6" end="6"/>
-                                            </p:txEl>
-                                          </p:spTgt>
-                                        </p:tgtEl>
-                                        <p:attrNameLst>
-                                          <p:attrName>style.visibility</p:attrName>
-                                        </p:attrNameLst>
-                                      </p:cBhvr>
-                                      <p:to>
-                                        <p:strVal val="visible"/>
-                                      </p:to>
-                                    </p:set>
-                                  </p:childTnLst>
-                                </p:cTn>
-                              </p:par>
-                            </p:childTnLst>
-                          </p:cTn>
-                        </p:par>
-                      </p:childTnLst>
-                    </p:cTn>
-                  </p:par>
-                  <p:par>
-                    <p:cTn id="7" fill="hold">
-                      <p:stCondLst>
-                        <p:cond delay="indefinite"/>
-                      </p:stCondLst>
-                      <p:childTnLst>
-                        <p:par>
-                          <p:cTn id="8" fill="hold">
-                            <p:stCondLst>
-                              <p:cond delay="0"/>
-                            </p:stCondLst>
-                            <p:childTnLst>
-                              <p:par>
-                                <p:cTn id="9" presetID="1" presetClass="entr" presetSubtype="0" fill="hold" nodeType="clickEffect">
-                                  <p:stCondLst>
-                                    <p:cond delay="0"/>
-                                  </p:stCondLst>
-                                  <p:childTnLst>
-                                    <p:set>
-                                      <p:cBhvr>
-                                        <p:cTn id="10" dur="1" fill="hold">
-                                          <p:stCondLst>
-                                            <p:cond delay="0"/>
-                                          </p:stCondLst>
-                                        </p:cTn>
-                                        <p:tgtEl>
-                                          <p:spTgt spid="8">
-                                            <p:txEl>
-                                              <p:pRg st="7" end="7"/>
-                                            </p:txEl>
-                                          </p:spTgt>
-                                        </p:tgtEl>
-                                        <p:attrNameLst>
-                                          <p:attrName>style.visibility</p:attrName>
-                                        </p:attrNameLst>
-                                      </p:cBhvr>
-                                      <p:to>
-                                        <p:strVal val="visible"/>
-                                      </p:to>
-                                    </p:set>
-                                  </p:childTnLst>
-                                </p:cTn>
-                              </p:par>
-                            </p:childTnLst>
-                          </p:cTn>
-                        </p:par>
-                      </p:childTnLst>
-                    </p:cTn>
-                  </p:par>
-                  <p:par>
-                    <p:cTn id="11" fill="hold">
-                      <p:stCondLst>
-                        <p:cond delay="indefinite"/>
-                      </p:stCondLst>
-                      <p:childTnLst>
-                        <p:par>
-                          <p:cTn id="12" fill="hold">
-                            <p:stCondLst>
-                              <p:cond delay="0"/>
-                            </p:stCondLst>
-                            <p:childTnLst>
-                              <p:par>
-                                <p:cTn id="13" presetID="1" presetClass="entr" presetSubtype="0" fill="hold" nodeType="clickEffect">
-                                  <p:stCondLst>
-                                    <p:cond delay="0"/>
-                                  </p:stCondLst>
-                                  <p:childTnLst>
-                                    <p:set>
-                                      <p:cBhvr>
-                                        <p:cTn id="14" dur="1" fill="hold">
-                                          <p:stCondLst>
-                                            <p:cond delay="0"/>
-                                          </p:stCondLst>
-                                        </p:cTn>
-                                        <p:tgtEl>
-                                          <p:spTgt spid="8">
-                                            <p:txEl>
-                                              <p:pRg st="8" end="8"/>
-                                            </p:txEl>
-                                          </p:spTgt>
-                                        </p:tgtEl>
-                                        <p:attrNameLst>
-                                          <p:attrName>style.visibility</p:attrName>
-                                        </p:attrNameLst>
-                                      </p:cBhvr>
-                                      <p:to>
-                                        <p:strVal val="visible"/>
-                                      </p:to>
-                                    </p:set>
-                                  </p:childTnLst>
-                                </p:cTn>
-                              </p:par>
-                            </p:childTnLst>
-                          </p:cTn>
-                        </p:par>
-                      </p:childTnLst>
-                    </p:cTn>
-                  </p:par>
-                  <p:par>
-                    <p:cTn id="15" fill="hold">
-                      <p:stCondLst>
-                        <p:cond delay="indefinite"/>
-                      </p:stCondLst>
-                      <p:childTnLst>
-                        <p:par>
-                          <p:cTn id="16" fill="hold">
-                            <p:stCondLst>
-                              <p:cond delay="0"/>
-                            </p:stCondLst>
-                            <p:childTnLst>
-                              <p:par>
-                                <p:cTn id="17" presetID="1" presetClass="entr" presetSubtype="0" fill="hold" nodeType="clickEffect">
-                                  <p:stCondLst>
-                                    <p:cond delay="0"/>
-                                  </p:stCondLst>
-                                  <p:childTnLst>
-                                    <p:set>
-                                      <p:cBhvr>
-                                        <p:cTn id="18" dur="1" fill="hold">
-                                          <p:stCondLst>
-                                            <p:cond delay="0"/>
-                                          </p:stCondLst>
-                                        </p:cTn>
-                                        <p:tgtEl>
-                                          <p:spTgt spid="8">
-                                            <p:txEl>
-                                              <p:pRg st="9" end="9"/>
-                                            </p:txEl>
-                                          </p:spTgt>
-                                        </p:tgtEl>
-                                        <p:attrNameLst>
-                                          <p:attrName>style.visibility</p:attrName>
-                                        </p:attrNameLst>
-                                      </p:cBhvr>
-                                      <p:to>
-                                        <p:strVal val="visible"/>
-                                      </p:to>
-                                    </p:set>
-                                  </p:childTnLst>
-                                </p:cTn>
-                              </p:par>
-                            </p:childTnLst>
-                          </p:cTn>
-                        </p:par>
-                      </p:childTnLst>
-                    </p:cTn>
-                  </p:par>
-                  <p:par>
-                    <p:cTn id="19" fill="hold">
-                      <p:stCondLst>
-                        <p:cond delay="indefinite"/>
-                      </p:stCondLst>
-                      <p:childTnLst>
-                        <p:par>
-                          <p:cTn id="20" fill="hold">
-                            <p:stCondLst>
-                              <p:cond delay="0"/>
-                            </p:stCondLst>
-                            <p:childTnLst>
-                              <p:par>
-                                <p:cTn id="21" presetID="1" presetClass="entr" presetSubtype="0" fill="hold" nodeType="clickEffect">
-                                  <p:stCondLst>
-                                    <p:cond delay="0"/>
-                                  </p:stCondLst>
-                                  <p:childTnLst>
-                                    <p:set>
-                                      <p:cBhvr>
-                                        <p:cTn id="22" dur="1" fill="hold">
-                                          <p:stCondLst>
-                                            <p:cond delay="0"/>
-                                          </p:stCondLst>
-                                        </p:cTn>
-                                        <p:tgtEl>
-                                          <p:spTgt spid="8">
-                                            <p:txEl>
-                                              <p:pRg st="10" end="10"/>
-                                            </p:txEl>
-                                          </p:spTgt>
-                                        </p:tgtEl>
-                                        <p:attrNameLst>
-                                          <p:attrName>style.visibility</p:attrName>
-                                        </p:attrNameLst>
-                                      </p:cBhvr>
-                                      <p:to>
-                                        <p:strVal val="visible"/>
-                                      </p:to>
-                                    </p:set>
-                                  </p:childTnLst>
-                                </p:cTn>
-                              </p:par>
-                            </p:childTnLst>
-                          </p:cTn>
-                        </p:par>
-                      </p:childTnLst>
-                    </p:cTn>
-                  </p:par>
-                  <p:par>
-                    <p:cTn id="23" fill="hold">
-                      <p:stCondLst>
-                        <p:cond delay="indefinite"/>
-                      </p:stCondLst>
-                      <p:childTnLst>
-                        <p:par>
-                          <p:cTn id="24" fill="hold">
-                            <p:stCondLst>
-                              <p:cond delay="0"/>
-                            </p:stCondLst>
-                            <p:childTnLst>
-                              <p:par>
-                                <p:cTn id="25" presetID="1" presetClass="entr" presetSubtype="0" fill="hold" nodeType="clickEffect">
-                                  <p:stCondLst>
-                                    <p:cond delay="0"/>
-                                  </p:stCondLst>
-                                  <p:childTnLst>
-                                    <p:set>
-                                      <p:cBhvr>
-                                        <p:cTn id="26" dur="1" fill="hold">
-                                          <p:stCondLst>
-                                            <p:cond delay="0"/>
-                                          </p:stCondLst>
-                                        </p:cTn>
-                                        <p:tgtEl>
-                                          <p:spTgt spid="8">
-                                            <p:txEl>
-                                              <p:pRg st="11" end="11"/>
-                                            </p:txEl>
-                                          </p:spTgt>
-                                        </p:tgtEl>
-                                        <p:attrNameLst>
-                                          <p:attrName>style.visibility</p:attrName>
-                                        </p:attrNameLst>
-                                      </p:cBhvr>
-                                      <p:to>
-                                        <p:strVal val="visible"/>
-                                      </p:to>
-                                    </p:set>
-                                  </p:childTnLst>
-                                </p:cTn>
-                              </p:par>
-                            </p:childTnLst>
-                          </p:cTn>
-                        </p:par>
-                      </p:childTnLst>
-                    </p:cTn>
-                  </p:par>
-                  <p:par>
-                    <p:cTn id="27" fill="hold">
-                      <p:stCondLst>
-                        <p:cond delay="indefinite"/>
-                      </p:stCondLst>
-                      <p:childTnLst>
-                        <p:par>
-                          <p:cTn id="28" fill="hold">
-                            <p:stCondLst>
-                              <p:cond delay="0"/>
-                            </p:stCondLst>
-                            <p:childTnLst>
-                              <p:par>
-                                <p:cTn id="29" presetID="1" presetClass="entr" presetSubtype="0" fill="hold" nodeType="clickEffect">
-                                  <p:stCondLst>
-                                    <p:cond delay="0"/>
-                                  </p:stCondLst>
-                                  <p:childTnLst>
-                                    <p:set>
-                                      <p:cBhvr>
-                                        <p:cTn id="30" dur="1" fill="hold">
-                                          <p:stCondLst>
-                                            <p:cond delay="0"/>
-                                          </p:stCondLst>
-                                        </p:cTn>
-                                        <p:tgtEl>
-                                          <p:spTgt spid="8">
-                                            <p:txEl>
-                                              <p:pRg st="12" end="12"/>
-                                            </p:txEl>
-                                          </p:spTgt>
-                                        </p:tgtEl>
-                                        <p:attrNameLst>
-                                          <p:attrName>style.visibility</p:attrName>
-                                        </p:attrNameLst>
-                                      </p:cBhvr>
-                                      <p:to>
-                                        <p:strVal val="visible"/>
-                                      </p:to>
-                                    </p:set>
-                                  </p:childTnLst>
-                                </p:cTn>
-                              </p:par>
-                            </p:childTnLst>
-                          </p:cTn>
-                        </p:par>
-                      </p:childTnLst>
-                    </p:cTn>
-                  </p:par>
-                  <p:par>
-                    <p:cTn id="31" fill="hold">
-                      <p:stCondLst>
-                        <p:cond delay="indefinite"/>
-                      </p:stCondLst>
-                      <p:childTnLst>
-                        <p:par>
-                          <p:cTn id="32" fill="hold">
-                            <p:stCondLst>
-                              <p:cond delay="0"/>
-                            </p:stCondLst>
-                            <p:childTnLst>
-                              <p:par>
-                                <p:cTn id="33" presetID="1" presetClass="entr" presetSubtype="0" fill="hold" nodeType="clickEffect">
-                                  <p:stCondLst>
-                                    <p:cond delay="0"/>
-                                  </p:stCondLst>
-                                  <p:childTnLst>
-                                    <p:set>
-                                      <p:cBhvr>
-                                        <p:cTn id="34" dur="1" fill="hold">
-                                          <p:stCondLst>
-                                            <p:cond delay="0"/>
-                                          </p:stCondLst>
-                                        </p:cTn>
-                                        <p:tgtEl>
-                                          <p:spTgt spid="8">
-                                            <p:txEl>
-                                              <p:pRg st="14" end="14"/>
-                                            </p:txEl>
-                                          </p:spTgt>
-                                        </p:tgtEl>
-                                        <p:attrNameLst>
-                                          <p:attrName>style.visibility</p:attrName>
-                                        </p:attrNameLst>
-                                      </p:cBhvr>
-                                      <p:to>
-                                        <p:strVal val="visible"/>
-                                      </p:to>
-                                    </p:set>
-                                  </p:childTnLst>
-                                </p:cTn>
-                              </p:par>
-                            </p:childTnLst>
-                          </p:cTn>
-                        </p:par>
-                      </p:childTnLst>
-                    </p:cTn>
-                  </p:par>
-                  <p:par>
-                    <p:cTn id="35" fill="hold">
-                      <p:stCondLst>
-                        <p:cond delay="indefinite"/>
-                      </p:stCondLst>
-                      <p:childTnLst>
-                        <p:par>
-                          <p:cTn id="36" fill="hold">
-                            <p:stCondLst>
-                              <p:cond delay="0"/>
-                            </p:stCondLst>
-                            <p:childTnLst>
-                              <p:par>
-                                <p:cTn id="37" presetID="1" presetClass="entr" presetSubtype="0" fill="hold" nodeType="clickEffect">
-                                  <p:stCondLst>
-                                    <p:cond delay="0"/>
-                                  </p:stCondLst>
-                                  <p:childTnLst>
-                                    <p:set>
-                                      <p:cBhvr>
-                                        <p:cTn id="38" dur="1" fill="hold">
-                                          <p:stCondLst>
-                                            <p:cond delay="0"/>
-                                          </p:stCondLst>
-                                        </p:cTn>
-                                        <p:tgtEl>
-                                          <p:spTgt spid="8">
-                                            <p:txEl>
-                                              <p:pRg st="15" end="15"/>
-                                            </p:txEl>
-                                          </p:spTgt>
-                                        </p:tgtEl>
-                                        <p:attrNameLst>
-                                          <p:attrName>style.visibility</p:attrName>
-                                        </p:attrNameLst>
-                                      </p:cBhvr>
-                                      <p:to>
-                                        <p:strVal val="visible"/>
-                                      </p:to>
-                                    </p:set>
-                                  </p:childTnLst>
-                                </p:cTn>
-                              </p:par>
-                            </p:childTnLst>
-                          </p:cTn>
-                        </p:par>
-                      </p:childTnLst>
-                    </p:cTn>
-                  </p:par>
-                  <p:par>
-                    <p:cTn id="39" fill="hold">
-                      <p:stCondLst>
-                        <p:cond delay="indefinite"/>
-                      </p:stCondLst>
-                      <p:childTnLst>
-                        <p:par>
-                          <p:cTn id="40" fill="hold">
-                            <p:stCondLst>
-                              <p:cond delay="0"/>
-                            </p:stCondLst>
-                            <p:childTnLst>
-                              <p:par>
-                                <p:cTn id="41" presetID="1" presetClass="entr" presetSubtype="0" fill="hold" nodeType="clickEffect">
-                                  <p:stCondLst>
-                                    <p:cond delay="0"/>
-                                  </p:stCondLst>
-                                  <p:childTnLst>
-                                    <p:set>
-                                      <p:cBhvr>
-                                        <p:cTn id="42" dur="1" fill="hold">
-                                          <p:stCondLst>
-                                            <p:cond delay="0"/>
-                                          </p:stCondLst>
-                                        </p:cTn>
-                                        <p:tgtEl>
-                                          <p:spTgt spid="8">
-                                            <p:txEl>
-                                              <p:pRg st="17" end="17"/>
-                                            </p:txEl>
-                                          </p:spTgt>
-                                        </p:tgtEl>
-                                        <p:attrNameLst>
-                                          <p:attrName>style.visibility</p:attrName>
-                                        </p:attrNameLst>
-                                      </p:cBhvr>
-                                      <p:to>
-                                        <p:strVal val="visible"/>
-                                      </p:to>
-                                    </p:set>
-                                  </p:childTnLst>
-                                </p:cTn>
-                              </p:par>
-                            </p:childTnLst>
-                          </p:cTn>
-                        </p:par>
-                      </p:childTnLst>
-                    </p:cTn>
-                  </p:par>
-                  <p:par>
-                    <p:cTn id="43" fill="hold">
-                      <p:stCondLst>
-                        <p:cond delay="indefinite"/>
-                      </p:stCondLst>
-                      <p:childTnLst>
-                        <p:par>
-                          <p:cTn id="44" fill="hold">
-                            <p:stCondLst>
-                              <p:cond delay="0"/>
-                            </p:stCondLst>
-                            <p:childTnLst>
-                              <p:par>
-                                <p:cTn id="45" presetID="1" presetClass="entr" presetSubtype="0" fill="hold" nodeType="clickEffect">
-                                  <p:stCondLst>
-                                    <p:cond delay="0"/>
-                                  </p:stCondLst>
-                                  <p:childTnLst>
-                                    <p:set>
-                                      <p:cBhvr>
-                                        <p:cTn id="46" dur="1" fill="hold">
-                                          <p:stCondLst>
-                                            <p:cond delay="0"/>
-                                          </p:stCondLst>
-                                        </p:cTn>
-                                        <p:tgtEl>
-                                          <p:spTgt spid="8">
-                                            <p:txEl>
-                                              <p:pRg st="18" end="18"/>
-                                            </p:txEl>
-                                          </p:spTgt>
-                                        </p:tgtEl>
-                                        <p:attrNameLst>
-                                          <p:attrName>style.visibility</p:attrName>
-                                        </p:attrNameLst>
-                                      </p:cBhvr>
-                                      <p:to>
-                                        <p:strVal val="visible"/>
-                                      </p:to>
-                                    </p:set>
-                                  </p:childTnLst>
-                                </p:cTn>
-                              </p:par>
-                            </p:childTnLst>
-                          </p:cTn>
-                        </p:par>
-                      </p:childTnLst>
-                    </p:cTn>
-                  </p:par>
-                  <p:par>
-                    <p:cTn id="47" fill="hold">
-                      <p:stCondLst>
-                        <p:cond delay="indefinite"/>
-                      </p:stCondLst>
-                      <p:childTnLst>
-                        <p:par>
-                          <p:cTn id="48" fill="hold">
-                            <p:stCondLst>
-                              <p:cond delay="0"/>
-                            </p:stCondLst>
-                            <p:childTnLst>
-                              <p:par>
-                                <p:cTn id="49" presetID="1" presetClass="entr" presetSubtype="0" fill="hold" nodeType="clickEffect">
-                                  <p:stCondLst>
-                                    <p:cond delay="0"/>
-                                  </p:stCondLst>
-                                  <p:childTnLst>
-                                    <p:set>
-                                      <p:cBhvr>
-                                        <p:cTn id="50" dur="1" fill="hold">
-                                          <p:stCondLst>
-                                            <p:cond delay="0"/>
-                                          </p:stCondLst>
-                                        </p:cTn>
-                                        <p:tgtEl>
-                                          <p:spTgt spid="8">
-                                            <p:txEl>
-                                              <p:pRg st="19" end="19"/>
                                             </p:txEl>
                                           </p:spTgt>
                                         </p:tgtEl>
@@ -8852,4 +6903,299 @@
     </a:ext>
   </a:extLst>
 </a:theme>
+</file>
+
+<file path=ppt/theme/theme2.xml><?xml version="1.0" encoding="utf-8"?>
+<a:theme xmlns:a="http://schemas.openxmlformats.org/drawingml/2006/main" name="Office Theme">
+  <a:themeElements>
+    <a:clrScheme name="Office">
+      <a:dk1>
+        <a:sysClr val="windowText" lastClr="000000"/>
+      </a:dk1>
+      <a:lt1>
+        <a:sysClr val="window" lastClr="FFFFFF"/>
+      </a:lt1>
+      <a:dk2>
+        <a:srgbClr val="44546A"/>
+      </a:dk2>
+      <a:lt2>
+        <a:srgbClr val="E7E6E6"/>
+      </a:lt2>
+      <a:accent1>
+        <a:srgbClr val="4472C4"/>
+      </a:accent1>
+      <a:accent2>
+        <a:srgbClr val="ED7D31"/>
+      </a:accent2>
+      <a:accent3>
+        <a:srgbClr val="A5A5A5"/>
+      </a:accent3>
+      <a:accent4>
+        <a:srgbClr val="FFC000"/>
+      </a:accent4>
+      <a:accent5>
+        <a:srgbClr val="5B9BD5"/>
+      </a:accent5>
+      <a:accent6>
+        <a:srgbClr val="70AD47"/>
+      </a:accent6>
+      <a:hlink>
+        <a:srgbClr val="0563C1"/>
+      </a:hlink>
+      <a:folHlink>
+        <a:srgbClr val="954F72"/>
+      </a:folHlink>
+    </a:clrScheme>
+    <a:fontScheme name="Office">
+      <a:majorFont>
+        <a:latin typeface="Calibri Light" panose="020F0302020204030204"/>
+        <a:ea typeface=""/>
+        <a:cs typeface=""/>
+        <a:font script="Jpan" typeface="游ゴシック Light"/>
+        <a:font script="Hang" typeface="맑은 고딕"/>
+        <a:font script="Hans" typeface="等线 Light"/>
+        <a:font script="Hant" typeface="新細明體"/>
+        <a:font script="Arab" typeface="Times New Roman"/>
+        <a:font script="Hebr" typeface="Times New Roman"/>
+        <a:font script="Thai" typeface="Angsana New"/>
+        <a:font script="Ethi" typeface="Nyala"/>
+        <a:font script="Beng" typeface="Vrinda"/>
+        <a:font script="Gujr" typeface="Shruti"/>
+        <a:font script="Khmr" typeface="MoolBoran"/>
+        <a:font script="Knda" typeface="Tunga"/>
+        <a:font script="Guru" typeface="Raavi"/>
+        <a:font script="Cans" typeface="Euphemia"/>
+        <a:font script="Cher" typeface="Plantagenet Cherokee"/>
+        <a:font script="Yiii" typeface="Microsoft Yi Baiti"/>
+        <a:font script="Tibt" typeface="Microsoft Himalaya"/>
+        <a:font script="Thaa" typeface="MV Boli"/>
+        <a:font script="Deva" typeface="Mangal"/>
+        <a:font script="Telu" typeface="Gautami"/>
+        <a:font script="Taml" typeface="Latha"/>
+        <a:font script="Syrc" typeface="Estrangelo Edessa"/>
+        <a:font script="Orya" typeface="Kalinga"/>
+        <a:font script="Mlym" typeface="Kartika"/>
+        <a:font script="Laoo" typeface="DokChampa"/>
+        <a:font script="Sinh" typeface="Iskoola Pota"/>
+        <a:font script="Mong" typeface="Mongolian Baiti"/>
+        <a:font script="Viet" typeface="Times New Roman"/>
+        <a:font script="Uigh" typeface="Microsoft Uighur"/>
+        <a:font script="Geor" typeface="Sylfaen"/>
+        <a:font script="Armn" typeface="Arial"/>
+        <a:font script="Bugi" typeface="Leelawadee UI"/>
+        <a:font script="Bopo" typeface="Microsoft JhengHei"/>
+        <a:font script="Java" typeface="Javanese Text"/>
+        <a:font script="Lisu" typeface="Segoe UI"/>
+        <a:font script="Mymr" typeface="Myanmar Text"/>
+        <a:font script="Nkoo" typeface="Ebrima"/>
+        <a:font script="Olck" typeface="Nirmala UI"/>
+        <a:font script="Osma" typeface="Ebrima"/>
+        <a:font script="Phag" typeface="Phagspa"/>
+        <a:font script="Syrn" typeface="Estrangelo Edessa"/>
+        <a:font script="Syrj" typeface="Estrangelo Edessa"/>
+        <a:font script="Syre" typeface="Estrangelo Edessa"/>
+        <a:font script="Sora" typeface="Nirmala UI"/>
+        <a:font script="Tale" typeface="Microsoft Tai Le"/>
+        <a:font script="Talu" typeface="Microsoft New Tai Lue"/>
+        <a:font script="Tfng" typeface="Ebrima"/>
+      </a:majorFont>
+      <a:minorFont>
+        <a:latin typeface="Calibri" panose="020F0502020204030204"/>
+        <a:ea typeface=""/>
+        <a:cs typeface=""/>
+        <a:font script="Jpan" typeface="游ゴシック"/>
+        <a:font script="Hang" typeface="맑은 고딕"/>
+        <a:font script="Hans" typeface="等线"/>
+        <a:font script="Hant" typeface="新細明體"/>
+        <a:font script="Arab" typeface="Arial"/>
+        <a:font script="Hebr" typeface="Arial"/>
+        <a:font script="Thai" typeface="Cordia New"/>
+        <a:font script="Ethi" typeface="Nyala"/>
+        <a:font script="Beng" typeface="Vrinda"/>
+        <a:font script="Gujr" typeface="Shruti"/>
+        <a:font script="Khmr" typeface="DaunPenh"/>
+        <a:font script="Knda" typeface="Tunga"/>
+        <a:font script="Guru" typeface="Raavi"/>
+        <a:font script="Cans" typeface="Euphemia"/>
+        <a:font script="Cher" typeface="Plantagenet Cherokee"/>
+        <a:font script="Yiii" typeface="Microsoft Yi Baiti"/>
+        <a:font script="Tibt" typeface="Microsoft Himalaya"/>
+        <a:font script="Thaa" typeface="MV Boli"/>
+        <a:font script="Deva" typeface="Mangal"/>
+        <a:font script="Telu" typeface="Gautami"/>
+        <a:font script="Taml" typeface="Latha"/>
+        <a:font script="Syrc" typeface="Estrangelo Edessa"/>
+        <a:font script="Orya" typeface="Kalinga"/>
+        <a:font script="Mlym" typeface="Kartika"/>
+        <a:font script="Laoo" typeface="DokChampa"/>
+        <a:font script="Sinh" typeface="Iskoola Pota"/>
+        <a:font script="Mong" typeface="Mongolian Baiti"/>
+        <a:font script="Viet" typeface="Arial"/>
+        <a:font script="Uigh" typeface="Microsoft Uighur"/>
+        <a:font script="Geor" typeface="Sylfaen"/>
+        <a:font script="Armn" typeface="Arial"/>
+        <a:font script="Bugi" typeface="Leelawadee UI"/>
+        <a:font script="Bopo" typeface="Microsoft JhengHei"/>
+        <a:font script="Java" typeface="Javanese Text"/>
+        <a:font script="Lisu" typeface="Segoe UI"/>
+        <a:font script="Mymr" typeface="Myanmar Text"/>
+        <a:font script="Nkoo" typeface="Ebrima"/>
+        <a:font script="Olck" typeface="Nirmala UI"/>
+        <a:font script="Osma" typeface="Ebrima"/>
+        <a:font script="Phag" typeface="Phagspa"/>
+        <a:font script="Syrn" typeface="Estrangelo Edessa"/>
+        <a:font script="Syrj" typeface="Estrangelo Edessa"/>
+        <a:font script="Syre" typeface="Estrangelo Edessa"/>
+        <a:font script="Sora" typeface="Nirmala UI"/>
+        <a:font script="Tale" typeface="Microsoft Tai Le"/>
+        <a:font script="Talu" typeface="Microsoft New Tai Lue"/>
+        <a:font script="Tfng" typeface="Ebrima"/>
+      </a:minorFont>
+    </a:fontScheme>
+    <a:fmtScheme name="Office">
+      <a:fillStyleLst>
+        <a:solidFill>
+          <a:schemeClr val="phClr"/>
+        </a:solidFill>
+        <a:gradFill rotWithShape="1">
+          <a:gsLst>
+            <a:gs pos="0">
+              <a:schemeClr val="phClr">
+                <a:lumMod val="110000"/>
+                <a:satMod val="105000"/>
+                <a:tint val="67000"/>
+              </a:schemeClr>
+            </a:gs>
+            <a:gs pos="50000">
+              <a:schemeClr val="phClr">
+                <a:lumMod val="105000"/>
+                <a:satMod val="103000"/>
+                <a:tint val="73000"/>
+              </a:schemeClr>
+            </a:gs>
+            <a:gs pos="100000">
+              <a:schemeClr val="phClr">
+                <a:lumMod val="105000"/>
+                <a:satMod val="109000"/>
+                <a:tint val="81000"/>
+              </a:schemeClr>
+            </a:gs>
+          </a:gsLst>
+          <a:lin ang="5400000" scaled="0"/>
+        </a:gradFill>
+        <a:gradFill rotWithShape="1">
+          <a:gsLst>
+            <a:gs pos="0">
+              <a:schemeClr val="phClr">
+                <a:satMod val="103000"/>
+                <a:lumMod val="102000"/>
+                <a:tint val="94000"/>
+              </a:schemeClr>
+            </a:gs>
+            <a:gs pos="50000">
+              <a:schemeClr val="phClr">
+                <a:satMod val="110000"/>
+                <a:lumMod val="100000"/>
+                <a:shade val="100000"/>
+              </a:schemeClr>
+            </a:gs>
+            <a:gs pos="100000">
+              <a:schemeClr val="phClr">
+                <a:lumMod val="99000"/>
+                <a:satMod val="120000"/>
+                <a:shade val="78000"/>
+              </a:schemeClr>
+            </a:gs>
+          </a:gsLst>
+          <a:lin ang="5400000" scaled="0"/>
+        </a:gradFill>
+      </a:fillStyleLst>
+      <a:lnStyleLst>
+        <a:ln w="6350" cap="flat" cmpd="sng" algn="ctr">
+          <a:solidFill>
+            <a:schemeClr val="phClr"/>
+          </a:solidFill>
+          <a:prstDash val="solid"/>
+          <a:miter lim="800000"/>
+        </a:ln>
+        <a:ln w="12700" cap="flat" cmpd="sng" algn="ctr">
+          <a:solidFill>
+            <a:schemeClr val="phClr"/>
+          </a:solidFill>
+          <a:prstDash val="solid"/>
+          <a:miter lim="800000"/>
+        </a:ln>
+        <a:ln w="19050" cap="flat" cmpd="sng" algn="ctr">
+          <a:solidFill>
+            <a:schemeClr val="phClr"/>
+          </a:solidFill>
+          <a:prstDash val="solid"/>
+          <a:miter lim="800000"/>
+        </a:ln>
+      </a:lnStyleLst>
+      <a:effectStyleLst>
+        <a:effectStyle>
+          <a:effectLst/>
+        </a:effectStyle>
+        <a:effectStyle>
+          <a:effectLst/>
+        </a:effectStyle>
+        <a:effectStyle>
+          <a:effectLst>
+            <a:outerShdw blurRad="57150" dist="19050" dir="5400000" algn="ctr" rotWithShape="0">
+              <a:srgbClr val="000000">
+                <a:alpha val="63000"/>
+              </a:srgbClr>
+            </a:outerShdw>
+          </a:effectLst>
+        </a:effectStyle>
+      </a:effectStyleLst>
+      <a:bgFillStyleLst>
+        <a:solidFill>
+          <a:schemeClr val="phClr"/>
+        </a:solidFill>
+        <a:solidFill>
+          <a:schemeClr val="phClr">
+            <a:tint val="95000"/>
+            <a:satMod val="170000"/>
+          </a:schemeClr>
+        </a:solidFill>
+        <a:gradFill rotWithShape="1">
+          <a:gsLst>
+            <a:gs pos="0">
+              <a:schemeClr val="phClr">
+                <a:tint val="93000"/>
+                <a:satMod val="150000"/>
+                <a:shade val="98000"/>
+                <a:lumMod val="102000"/>
+              </a:schemeClr>
+            </a:gs>
+            <a:gs pos="50000">
+              <a:schemeClr val="phClr">
+                <a:tint val="98000"/>
+                <a:satMod val="130000"/>
+                <a:shade val="90000"/>
+                <a:lumMod val="103000"/>
+              </a:schemeClr>
+            </a:gs>
+            <a:gs pos="100000">
+              <a:schemeClr val="phClr">
+                <a:shade val="63000"/>
+                <a:satMod val="120000"/>
+              </a:schemeClr>
+            </a:gs>
+          </a:gsLst>
+          <a:lin ang="5400000" scaled="0"/>
+        </a:gradFill>
+      </a:bgFillStyleLst>
+    </a:fmtScheme>
+  </a:themeElements>
+  <a:objectDefaults/>
+  <a:extraClrSchemeLst/>
+  <a:extLst>
+    <a:ext uri="{05A4C25C-085E-4340-85A3-A5531E510DB2}">
+      <thm15:themeFamily xmlns:thm15="http://schemas.microsoft.com/office/thememl/2012/main" name="Office Theme" id="{62F939B6-93AF-4DB8-9C6B-D6C7DFDC589F}" vid="{4A3C46E8-61CC-4603-A589-7422A47A8E4A}"/>
+    </a:ext>
+  </a:extLst>
+</a:theme>
 </file>
</xml_diff>